<commit_message>
Ultima actualización - 01-12-2025 23:05
</commit_message>
<xml_diff>
--- a/Fase 3/Presentación final.pptx
+++ b/Fase 3/Presentación final.pptx
@@ -12860,7 +12860,7 @@
             <a:tbl>
               <a:tblPr bandRow="1">
                 <a:noFill/>
-                <a:tableStyleId>{DC084E46-ECF8-4E6A-96B3-51DBD29C3997}</a:tableStyleId>
+                <a:tableStyleId>{B0992EC9-E086-4C07-B441-F85CB0D95FCE}</a:tableStyleId>
               </a:tblPr>
               <a:tblGrid>
                 <a:gridCol w="1751200"/>
@@ -20297,8 +20297,8 @@
         </p:nvSpPr>
         <p:spPr>
           <a:xfrm>
-            <a:off x="4006649" y="329025"/>
-            <a:ext cx="10274700" cy="1077600"/>
+            <a:off x="3031050" y="329025"/>
+            <a:ext cx="12225900" cy="1077600"/>
           </a:xfrm>
           <a:prstGeom prst="rect">
             <a:avLst/>
@@ -20336,7 +20336,7 @@
                 <a:cs typeface="Montserrat"/>
                 <a:sym typeface="Montserrat"/>
               </a:rPr>
-              <a:t>Modelo de basedatos</a:t>
+              <a:t>Modelo de base de datos</a:t>
             </a:r>
             <a:endParaRPr/>
           </a:p>

</xml_diff>

<commit_message>
Ultima actualización - 02-12-2025 23:05
</commit_message>
<xml_diff>
--- a/Fase 3/Presentación final.pptx
+++ b/Fase 3/Presentación final.pptx
@@ -27,14 +27,16 @@
     <p:sldId id="272" r:id="rId23"/>
     <p:sldId id="273" r:id="rId24"/>
     <p:sldId id="274" r:id="rId25"/>
+    <p:sldId id="275" r:id="rId26"/>
+    <p:sldId id="276" r:id="rId27"/>
   </p:sldIdLst>
   <p:sldSz cy="10287000" cx="18288000"/>
   <p:notesSz cx="6858000" cy="9144000"/>
   <p:embeddedFontLst>
     <p:embeddedFont>
       <p:font typeface="Montserrat"/>
-      <p:bold r:id="rId26"/>
-      <p:boldItalic r:id="rId27"/>
+      <p:bold r:id="rId28"/>
+      <p:boldItalic r:id="rId29"/>
     </p:embeddedFont>
   </p:embeddedFontLst>
   <p:defaultTextStyle>
@@ -282,7 +284,7 @@
       </p15:sldGuideLst>
     </p:ext>
     <p:ext uri="GoogleSlidesCustomDataVersion2">
-      <go:slidesCustomData xmlns:go="http://customooxmlschemas.google.com/" r:id="rId28" roundtripDataSignature="AMtx7mi6VVAjxtXQvb4+qCgL7Ylo1OSBhw=="/>
+      <go:slidesCustomData xmlns:go="http://customooxmlschemas.google.com/" r:id="rId30" roundtripDataSignature="AMtx7miQLeQbQEWSu4MiH2cRrcLUJuxHRQ=="/>
     </p:ext>
   </p:extLst>
 </p:presentation>
@@ -1228,46 +1230,7 @@
       </p:grpSpPr>
       <p:sp>
         <p:nvSpPr>
-          <p:cNvPr id="204" name="Google Shape;204;p14:notes"/>
-          <p:cNvSpPr txBox="1"/>
-          <p:nvPr>
-            <p:ph idx="1" type="body"/>
-          </p:nvPr>
-        </p:nvSpPr>
-        <p:spPr>
-          <a:xfrm>
-            <a:off x="685800" y="4343400"/>
-            <a:ext cx="5486400" cy="4114800"/>
-          </a:xfrm>
-          <a:prstGeom prst="rect">
-            <a:avLst/>
-          </a:prstGeom>
-        </p:spPr>
-        <p:txBody>
-          <a:bodyPr anchorCtr="0" anchor="t" bIns="91425" lIns="91425" spcFirstLastPara="1" rIns="91425" wrap="square" tIns="91425">
-            <a:noAutofit/>
-          </a:bodyPr>
-          <a:lstStyle/>
-          <a:p>
-            <a:pPr indent="0" lvl="0" marL="0" rtl="0" algn="l">
-              <a:spcBef>
-                <a:spcPts val="0"/>
-              </a:spcBef>
-              <a:spcAft>
-                <a:spcPts val="0"/>
-              </a:spcAft>
-              <a:buNone/>
-            </a:pPr>
-            <a:r>
-              <a:t/>
-            </a:r>
-            <a:endParaRPr/>
-          </a:p>
-        </p:txBody>
-      </p:sp>
-      <p:sp>
-        <p:nvSpPr>
-          <p:cNvPr id="205" name="Google Shape;205;p14:notes"/>
+          <p:cNvPr id="204" name="Google Shape;204;g3913aff3a0d_0_0:notes"/>
           <p:cNvSpPr/>
           <p:nvPr>
             <p:ph idx="2" type="sldImg"/>
@@ -1276,7 +1239,7 @@
         <p:spPr>
           <a:xfrm>
             <a:off x="1143225" y="685800"/>
-            <a:ext cx="4572225" cy="3429000"/>
+            <a:ext cx="4572300" cy="3429000"/>
           </a:xfrm>
           <a:custGeom>
             <a:rect b="b" l="l" r="r" t="t"/>
@@ -1300,34 +1263,9 @@
           </a:custGeom>
         </p:spPr>
       </p:sp>
-    </p:spTree>
-  </p:cSld>
-  <p:clrMapOvr>
-    <a:masterClrMapping/>
-  </p:clrMapOvr>
-</p:notes>
-</file>
-
-<file path=ppt/notesSlides/notesSlide15.xml><?xml version="1.0" encoding="utf-8"?>
-<p:notes xmlns:a="http://schemas.openxmlformats.org/drawingml/2006/main" xmlns:r="http://schemas.openxmlformats.org/officeDocument/2006/relationships" xmlns:mc="http://schemas.openxmlformats.org/markup-compatibility/2006" xmlns:mv="urn:schemas-microsoft-com:mac:vml" xmlns:p="http://schemas.openxmlformats.org/presentationml/2006/main" xmlns:c="http://schemas.openxmlformats.org/drawingml/2006/chart" xmlns:dgm="http://schemas.openxmlformats.org/drawingml/2006/diagram" xmlns:o="urn:schemas-microsoft-com:office:office" xmlns:v="urn:schemas-microsoft-com:vml" xmlns:pvml="urn:schemas-microsoft-com:office:powerpoint" xmlns:com="http://schemas.openxmlformats.org/drawingml/2006/compatibility" xmlns:p14="http://schemas.microsoft.com/office/powerpoint/2010/main" xmlns:p15="http://schemas.microsoft.com/office/powerpoint/2012/main" xmlns:ahyp="http://schemas.microsoft.com/office/drawing/2018/hyperlinkcolor" showMasterPhAnim="0" showMasterSp="0">
-  <p:cSld>
-    <p:spTree>
-      <p:nvGrpSpPr>
-        <p:cNvPr id="223" name="Shape 223"/>
-        <p:cNvGrpSpPr/>
-        <p:nvPr/>
-      </p:nvGrpSpPr>
-      <p:grpSpPr>
-        <a:xfrm>
-          <a:off x="0" y="0"/>
-          <a:ext cx="0" cy="0"/>
-          <a:chOff x="0" y="0"/>
-          <a:chExt cx="0" cy="0"/>
-        </a:xfrm>
-      </p:grpSpPr>
       <p:sp>
         <p:nvSpPr>
-          <p:cNvPr id="224" name="Google Shape;224;p15:notes"/>
+          <p:cNvPr id="205" name="Google Shape;205;g3913aff3a0d_0_0:notes"/>
           <p:cNvSpPr txBox="1"/>
           <p:nvPr>
             <p:ph idx="1" type="body"/>
@@ -1364,9 +1302,73 @@
           </a:p>
         </p:txBody>
       </p:sp>
+    </p:spTree>
+  </p:cSld>
+  <p:clrMapOvr>
+    <a:masterClrMapping/>
+  </p:clrMapOvr>
+</p:notes>
+</file>
+
+<file path=ppt/notesSlides/notesSlide15.xml><?xml version="1.0" encoding="utf-8"?>
+<p:notes xmlns:a="http://schemas.openxmlformats.org/drawingml/2006/main" xmlns:r="http://schemas.openxmlformats.org/officeDocument/2006/relationships" xmlns:mc="http://schemas.openxmlformats.org/markup-compatibility/2006" xmlns:mv="urn:schemas-microsoft-com:mac:vml" xmlns:p="http://schemas.openxmlformats.org/presentationml/2006/main" xmlns:c="http://schemas.openxmlformats.org/drawingml/2006/chart" xmlns:dgm="http://schemas.openxmlformats.org/drawingml/2006/diagram" xmlns:o="urn:schemas-microsoft-com:office:office" xmlns:v="urn:schemas-microsoft-com:vml" xmlns:pvml="urn:schemas-microsoft-com:office:powerpoint" xmlns:com="http://schemas.openxmlformats.org/drawingml/2006/compatibility" xmlns:p14="http://schemas.microsoft.com/office/powerpoint/2010/main" xmlns:p15="http://schemas.microsoft.com/office/powerpoint/2012/main" xmlns:ahyp="http://schemas.microsoft.com/office/drawing/2018/hyperlinkcolor" showMasterPhAnim="0" showMasterSp="0">
+  <p:cSld>
+    <p:spTree>
+      <p:nvGrpSpPr>
+        <p:cNvPr id="208" name="Shape 208"/>
+        <p:cNvGrpSpPr/>
+        <p:nvPr/>
+      </p:nvGrpSpPr>
+      <p:grpSpPr>
+        <a:xfrm>
+          <a:off x="0" y="0"/>
+          <a:ext cx="0" cy="0"/>
+          <a:chOff x="0" y="0"/>
+          <a:chExt cx="0" cy="0"/>
+        </a:xfrm>
+      </p:grpSpPr>
       <p:sp>
         <p:nvSpPr>
-          <p:cNvPr id="225" name="Google Shape;225;p15:notes"/>
+          <p:cNvPr id="209" name="Google Shape;209;p14:notes"/>
+          <p:cNvSpPr txBox="1"/>
+          <p:nvPr>
+            <p:ph idx="1" type="body"/>
+          </p:nvPr>
+        </p:nvSpPr>
+        <p:spPr>
+          <a:xfrm>
+            <a:off x="685800" y="4343400"/>
+            <a:ext cx="5486400" cy="4114800"/>
+          </a:xfrm>
+          <a:prstGeom prst="rect">
+            <a:avLst/>
+          </a:prstGeom>
+        </p:spPr>
+        <p:txBody>
+          <a:bodyPr anchorCtr="0" anchor="t" bIns="91425" lIns="91425" spcFirstLastPara="1" rIns="91425" wrap="square" tIns="91425">
+            <a:noAutofit/>
+          </a:bodyPr>
+          <a:lstStyle/>
+          <a:p>
+            <a:pPr indent="0" lvl="0" marL="0" rtl="0" algn="l">
+              <a:spcBef>
+                <a:spcPts val="0"/>
+              </a:spcBef>
+              <a:spcAft>
+                <a:spcPts val="0"/>
+              </a:spcAft>
+              <a:buNone/>
+            </a:pPr>
+            <a:r>
+              <a:t/>
+            </a:r>
+            <a:endParaRPr/>
+          </a:p>
+        </p:txBody>
+      </p:sp>
+      <p:sp>
+        <p:nvSpPr>
+          <p:cNvPr id="210" name="Google Shape;210;p14:notes"/>
           <p:cNvSpPr/>
           <p:nvPr>
             <p:ph idx="2" type="sldImg"/>
@@ -1412,7 +1414,7 @@
   <p:cSld>
     <p:spTree>
       <p:nvGrpSpPr>
-        <p:cNvPr id="228" name="Shape 228"/>
+        <p:cNvPr id="227" name="Shape 227"/>
         <p:cNvGrpSpPr/>
         <p:nvPr/>
       </p:nvGrpSpPr>
@@ -1426,46 +1428,7 @@
       </p:grpSpPr>
       <p:sp>
         <p:nvSpPr>
-          <p:cNvPr id="229" name="Google Shape;229;p16:notes"/>
-          <p:cNvSpPr txBox="1"/>
-          <p:nvPr>
-            <p:ph idx="1" type="body"/>
-          </p:nvPr>
-        </p:nvSpPr>
-        <p:spPr>
-          <a:xfrm>
-            <a:off x="685800" y="4343400"/>
-            <a:ext cx="5486400" cy="4114800"/>
-          </a:xfrm>
-          <a:prstGeom prst="rect">
-            <a:avLst/>
-          </a:prstGeom>
-        </p:spPr>
-        <p:txBody>
-          <a:bodyPr anchorCtr="0" anchor="t" bIns="91425" lIns="91425" spcFirstLastPara="1" rIns="91425" wrap="square" tIns="91425">
-            <a:noAutofit/>
-          </a:bodyPr>
-          <a:lstStyle/>
-          <a:p>
-            <a:pPr indent="0" lvl="0" marL="0" rtl="0" algn="l">
-              <a:spcBef>
-                <a:spcPts val="0"/>
-              </a:spcBef>
-              <a:spcAft>
-                <a:spcPts val="0"/>
-              </a:spcAft>
-              <a:buNone/>
-            </a:pPr>
-            <a:r>
-              <a:t/>
-            </a:r>
-            <a:endParaRPr/>
-          </a:p>
-        </p:txBody>
-      </p:sp>
-      <p:sp>
-        <p:nvSpPr>
-          <p:cNvPr id="230" name="Google Shape;230;p16:notes"/>
+          <p:cNvPr id="228" name="Google Shape;228;g3913aff3a0d_0_3:notes"/>
           <p:cNvSpPr/>
           <p:nvPr>
             <p:ph idx="2" type="sldImg"/>
@@ -1474,7 +1437,7 @@
         <p:spPr>
           <a:xfrm>
             <a:off x="1143225" y="685800"/>
-            <a:ext cx="4572225" cy="3429000"/>
+            <a:ext cx="4572300" cy="3429000"/>
           </a:xfrm>
           <a:custGeom>
             <a:rect b="b" l="l" r="r" t="t"/>
@@ -1498,34 +1461,9 @@
           </a:custGeom>
         </p:spPr>
       </p:sp>
-    </p:spTree>
-  </p:cSld>
-  <p:clrMapOvr>
-    <a:masterClrMapping/>
-  </p:clrMapOvr>
-</p:notes>
-</file>
-
-<file path=ppt/notesSlides/notesSlide17.xml><?xml version="1.0" encoding="utf-8"?>
-<p:notes xmlns:a="http://schemas.openxmlformats.org/drawingml/2006/main" xmlns:r="http://schemas.openxmlformats.org/officeDocument/2006/relationships" xmlns:mc="http://schemas.openxmlformats.org/markup-compatibility/2006" xmlns:mv="urn:schemas-microsoft-com:mac:vml" xmlns:p="http://schemas.openxmlformats.org/presentationml/2006/main" xmlns:c="http://schemas.openxmlformats.org/drawingml/2006/chart" xmlns:dgm="http://schemas.openxmlformats.org/drawingml/2006/diagram" xmlns:o="urn:schemas-microsoft-com:office:office" xmlns:v="urn:schemas-microsoft-com:vml" xmlns:pvml="urn:schemas-microsoft-com:office:powerpoint" xmlns:com="http://schemas.openxmlformats.org/drawingml/2006/compatibility" xmlns:p14="http://schemas.microsoft.com/office/powerpoint/2010/main" xmlns:p15="http://schemas.microsoft.com/office/powerpoint/2012/main" xmlns:ahyp="http://schemas.microsoft.com/office/drawing/2018/hyperlinkcolor" showMasterPhAnim="0" showMasterSp="0">
-  <p:cSld>
-    <p:spTree>
-      <p:nvGrpSpPr>
-        <p:cNvPr id="236" name="Shape 236"/>
-        <p:cNvGrpSpPr/>
-        <p:nvPr/>
-      </p:nvGrpSpPr>
-      <p:grpSpPr>
-        <a:xfrm>
-          <a:off x="0" y="0"/>
-          <a:ext cx="0" cy="0"/>
-          <a:chOff x="0" y="0"/>
-          <a:chExt cx="0" cy="0"/>
-        </a:xfrm>
-      </p:grpSpPr>
       <p:sp>
         <p:nvSpPr>
-          <p:cNvPr id="237" name="Google Shape;237;p17:notes"/>
+          <p:cNvPr id="229" name="Google Shape;229;g3913aff3a0d_0_3:notes"/>
           <p:cNvSpPr txBox="1"/>
           <p:nvPr>
             <p:ph idx="1" type="body"/>
@@ -1562,9 +1500,73 @@
           </a:p>
         </p:txBody>
       </p:sp>
+    </p:spTree>
+  </p:cSld>
+  <p:clrMapOvr>
+    <a:masterClrMapping/>
+  </p:clrMapOvr>
+</p:notes>
+</file>
+
+<file path=ppt/notesSlides/notesSlide17.xml><?xml version="1.0" encoding="utf-8"?>
+<p:notes xmlns:a="http://schemas.openxmlformats.org/drawingml/2006/main" xmlns:r="http://schemas.openxmlformats.org/officeDocument/2006/relationships" xmlns:mc="http://schemas.openxmlformats.org/markup-compatibility/2006" xmlns:mv="urn:schemas-microsoft-com:mac:vml" xmlns:p="http://schemas.openxmlformats.org/presentationml/2006/main" xmlns:c="http://schemas.openxmlformats.org/drawingml/2006/chart" xmlns:dgm="http://schemas.openxmlformats.org/drawingml/2006/diagram" xmlns:o="urn:schemas-microsoft-com:office:office" xmlns:v="urn:schemas-microsoft-com:vml" xmlns:pvml="urn:schemas-microsoft-com:office:powerpoint" xmlns:com="http://schemas.openxmlformats.org/drawingml/2006/compatibility" xmlns:p14="http://schemas.microsoft.com/office/powerpoint/2010/main" xmlns:p15="http://schemas.microsoft.com/office/powerpoint/2012/main" xmlns:ahyp="http://schemas.microsoft.com/office/drawing/2018/hyperlinkcolor" showMasterPhAnim="0" showMasterSp="0">
+  <p:cSld>
+    <p:spTree>
+      <p:nvGrpSpPr>
+        <p:cNvPr id="234" name="Shape 234"/>
+        <p:cNvGrpSpPr/>
+        <p:nvPr/>
+      </p:nvGrpSpPr>
+      <p:grpSpPr>
+        <a:xfrm>
+          <a:off x="0" y="0"/>
+          <a:ext cx="0" cy="0"/>
+          <a:chOff x="0" y="0"/>
+          <a:chExt cx="0" cy="0"/>
+        </a:xfrm>
+      </p:grpSpPr>
       <p:sp>
         <p:nvSpPr>
-          <p:cNvPr id="238" name="Google Shape;238;p17:notes"/>
+          <p:cNvPr id="235" name="Google Shape;235;p15:notes"/>
+          <p:cNvSpPr txBox="1"/>
+          <p:nvPr>
+            <p:ph idx="1" type="body"/>
+          </p:nvPr>
+        </p:nvSpPr>
+        <p:spPr>
+          <a:xfrm>
+            <a:off x="685800" y="4343400"/>
+            <a:ext cx="5486400" cy="4114800"/>
+          </a:xfrm>
+          <a:prstGeom prst="rect">
+            <a:avLst/>
+          </a:prstGeom>
+        </p:spPr>
+        <p:txBody>
+          <a:bodyPr anchorCtr="0" anchor="t" bIns="91425" lIns="91425" spcFirstLastPara="1" rIns="91425" wrap="square" tIns="91425">
+            <a:noAutofit/>
+          </a:bodyPr>
+          <a:lstStyle/>
+          <a:p>
+            <a:pPr indent="0" lvl="0" marL="0" rtl="0" algn="l">
+              <a:spcBef>
+                <a:spcPts val="0"/>
+              </a:spcBef>
+              <a:spcAft>
+                <a:spcPts val="0"/>
+              </a:spcAft>
+              <a:buNone/>
+            </a:pPr>
+            <a:r>
+              <a:t/>
+            </a:r>
+            <a:endParaRPr/>
+          </a:p>
+        </p:txBody>
+      </p:sp>
+      <p:sp>
+        <p:nvSpPr>
+          <p:cNvPr id="236" name="Google Shape;236;p15:notes"/>
           <p:cNvSpPr/>
           <p:nvPr>
             <p:ph idx="2" type="sldImg"/>
@@ -1610,7 +1612,7 @@
   <p:cSld>
     <p:spTree>
       <p:nvGrpSpPr>
-        <p:cNvPr id="244" name="Shape 244"/>
+        <p:cNvPr id="239" name="Shape 239"/>
         <p:cNvGrpSpPr/>
         <p:nvPr/>
       </p:nvGrpSpPr>
@@ -1624,7 +1626,7 @@
       </p:grpSpPr>
       <p:sp>
         <p:nvSpPr>
-          <p:cNvPr id="245" name="Google Shape;245;p18:notes"/>
+          <p:cNvPr id="240" name="Google Shape;240;p16:notes"/>
           <p:cNvSpPr txBox="1"/>
           <p:nvPr>
             <p:ph idx="1" type="body"/>
@@ -1663,7 +1665,7 @@
       </p:sp>
       <p:sp>
         <p:nvSpPr>
-          <p:cNvPr id="246" name="Google Shape;246;p18:notes"/>
+          <p:cNvPr id="241" name="Google Shape;241;p16:notes"/>
           <p:cNvSpPr/>
           <p:nvPr>
             <p:ph idx="2" type="sldImg"/>
@@ -1709,7 +1711,7 @@
   <p:cSld>
     <p:spTree>
       <p:nvGrpSpPr>
-        <p:cNvPr id="252" name="Shape 252"/>
+        <p:cNvPr id="247" name="Shape 247"/>
         <p:cNvGrpSpPr/>
         <p:nvPr/>
       </p:nvGrpSpPr>
@@ -1723,7 +1725,7 @@
       </p:grpSpPr>
       <p:sp>
         <p:nvSpPr>
-          <p:cNvPr id="253" name="Google Shape;253;p19:notes"/>
+          <p:cNvPr id="248" name="Google Shape;248;p17:notes"/>
           <p:cNvSpPr txBox="1"/>
           <p:nvPr>
             <p:ph idx="1" type="body"/>
@@ -1762,7 +1764,7 @@
       </p:sp>
       <p:sp>
         <p:nvSpPr>
-          <p:cNvPr id="254" name="Google Shape;254;p19:notes"/>
+          <p:cNvPr id="249" name="Google Shape;249;p17:notes"/>
           <p:cNvSpPr/>
           <p:nvPr>
             <p:ph idx="2" type="sldImg"/>
@@ -1862,6 +1864,204 @@
       <p:sp>
         <p:nvSpPr>
           <p:cNvPr id="92" name="Google Shape;92;p2:notes"/>
+          <p:cNvSpPr/>
+          <p:nvPr>
+            <p:ph idx="2" type="sldImg"/>
+          </p:nvPr>
+        </p:nvSpPr>
+        <p:spPr>
+          <a:xfrm>
+            <a:off x="1143225" y="685800"/>
+            <a:ext cx="4572225" cy="3429000"/>
+          </a:xfrm>
+          <a:custGeom>
+            <a:rect b="b" l="l" r="r" t="t"/>
+            <a:pathLst>
+              <a:path extrusionOk="0" h="120000" w="120000">
+                <a:moveTo>
+                  <a:pt x="0" y="0"/>
+                </a:moveTo>
+                <a:lnTo>
+                  <a:pt x="120000" y="0"/>
+                </a:lnTo>
+                <a:lnTo>
+                  <a:pt x="120000" y="120000"/>
+                </a:lnTo>
+                <a:lnTo>
+                  <a:pt x="0" y="120000"/>
+                </a:lnTo>
+                <a:close/>
+              </a:path>
+            </a:pathLst>
+          </a:custGeom>
+        </p:spPr>
+      </p:sp>
+    </p:spTree>
+  </p:cSld>
+  <p:clrMapOvr>
+    <a:masterClrMapping/>
+  </p:clrMapOvr>
+</p:notes>
+</file>
+
+<file path=ppt/notesSlides/notesSlide20.xml><?xml version="1.0" encoding="utf-8"?>
+<p:notes xmlns:a="http://schemas.openxmlformats.org/drawingml/2006/main" xmlns:r="http://schemas.openxmlformats.org/officeDocument/2006/relationships" xmlns:mc="http://schemas.openxmlformats.org/markup-compatibility/2006" xmlns:mv="urn:schemas-microsoft-com:mac:vml" xmlns:p="http://schemas.openxmlformats.org/presentationml/2006/main" xmlns:c="http://schemas.openxmlformats.org/drawingml/2006/chart" xmlns:dgm="http://schemas.openxmlformats.org/drawingml/2006/diagram" xmlns:o="urn:schemas-microsoft-com:office:office" xmlns:v="urn:schemas-microsoft-com:vml" xmlns:pvml="urn:schemas-microsoft-com:office:powerpoint" xmlns:com="http://schemas.openxmlformats.org/drawingml/2006/compatibility" xmlns:p14="http://schemas.microsoft.com/office/powerpoint/2010/main" xmlns:p15="http://schemas.microsoft.com/office/powerpoint/2012/main" xmlns:ahyp="http://schemas.microsoft.com/office/drawing/2018/hyperlinkcolor" showMasterPhAnim="0" showMasterSp="0">
+  <p:cSld>
+    <p:spTree>
+      <p:nvGrpSpPr>
+        <p:cNvPr id="255" name="Shape 255"/>
+        <p:cNvGrpSpPr/>
+        <p:nvPr/>
+      </p:nvGrpSpPr>
+      <p:grpSpPr>
+        <a:xfrm>
+          <a:off x="0" y="0"/>
+          <a:ext cx="0" cy="0"/>
+          <a:chOff x="0" y="0"/>
+          <a:chExt cx="0" cy="0"/>
+        </a:xfrm>
+      </p:grpSpPr>
+      <p:sp>
+        <p:nvSpPr>
+          <p:cNvPr id="256" name="Google Shape;256;p18:notes"/>
+          <p:cNvSpPr txBox="1"/>
+          <p:nvPr>
+            <p:ph idx="1" type="body"/>
+          </p:nvPr>
+        </p:nvSpPr>
+        <p:spPr>
+          <a:xfrm>
+            <a:off x="685800" y="4343400"/>
+            <a:ext cx="5486400" cy="4114800"/>
+          </a:xfrm>
+          <a:prstGeom prst="rect">
+            <a:avLst/>
+          </a:prstGeom>
+        </p:spPr>
+        <p:txBody>
+          <a:bodyPr anchorCtr="0" anchor="t" bIns="91425" lIns="91425" spcFirstLastPara="1" rIns="91425" wrap="square" tIns="91425">
+            <a:noAutofit/>
+          </a:bodyPr>
+          <a:lstStyle/>
+          <a:p>
+            <a:pPr indent="0" lvl="0" marL="0" rtl="0" algn="l">
+              <a:spcBef>
+                <a:spcPts val="0"/>
+              </a:spcBef>
+              <a:spcAft>
+                <a:spcPts val="0"/>
+              </a:spcAft>
+              <a:buNone/>
+            </a:pPr>
+            <a:r>
+              <a:t/>
+            </a:r>
+            <a:endParaRPr/>
+          </a:p>
+        </p:txBody>
+      </p:sp>
+      <p:sp>
+        <p:nvSpPr>
+          <p:cNvPr id="257" name="Google Shape;257;p18:notes"/>
+          <p:cNvSpPr/>
+          <p:nvPr>
+            <p:ph idx="2" type="sldImg"/>
+          </p:nvPr>
+        </p:nvSpPr>
+        <p:spPr>
+          <a:xfrm>
+            <a:off x="1143225" y="685800"/>
+            <a:ext cx="4572225" cy="3429000"/>
+          </a:xfrm>
+          <a:custGeom>
+            <a:rect b="b" l="l" r="r" t="t"/>
+            <a:pathLst>
+              <a:path extrusionOk="0" h="120000" w="120000">
+                <a:moveTo>
+                  <a:pt x="0" y="0"/>
+                </a:moveTo>
+                <a:lnTo>
+                  <a:pt x="120000" y="0"/>
+                </a:lnTo>
+                <a:lnTo>
+                  <a:pt x="120000" y="120000"/>
+                </a:lnTo>
+                <a:lnTo>
+                  <a:pt x="0" y="120000"/>
+                </a:lnTo>
+                <a:close/>
+              </a:path>
+            </a:pathLst>
+          </a:custGeom>
+        </p:spPr>
+      </p:sp>
+    </p:spTree>
+  </p:cSld>
+  <p:clrMapOvr>
+    <a:masterClrMapping/>
+  </p:clrMapOvr>
+</p:notes>
+</file>
+
+<file path=ppt/notesSlides/notesSlide21.xml><?xml version="1.0" encoding="utf-8"?>
+<p:notes xmlns:a="http://schemas.openxmlformats.org/drawingml/2006/main" xmlns:r="http://schemas.openxmlformats.org/officeDocument/2006/relationships" xmlns:mc="http://schemas.openxmlformats.org/markup-compatibility/2006" xmlns:mv="urn:schemas-microsoft-com:mac:vml" xmlns:p="http://schemas.openxmlformats.org/presentationml/2006/main" xmlns:c="http://schemas.openxmlformats.org/drawingml/2006/chart" xmlns:dgm="http://schemas.openxmlformats.org/drawingml/2006/diagram" xmlns:o="urn:schemas-microsoft-com:office:office" xmlns:v="urn:schemas-microsoft-com:vml" xmlns:pvml="urn:schemas-microsoft-com:office:powerpoint" xmlns:com="http://schemas.openxmlformats.org/drawingml/2006/compatibility" xmlns:p14="http://schemas.microsoft.com/office/powerpoint/2010/main" xmlns:p15="http://schemas.microsoft.com/office/powerpoint/2012/main" xmlns:ahyp="http://schemas.microsoft.com/office/drawing/2018/hyperlinkcolor" showMasterPhAnim="0" showMasterSp="0">
+  <p:cSld>
+    <p:spTree>
+      <p:nvGrpSpPr>
+        <p:cNvPr id="263" name="Shape 263"/>
+        <p:cNvGrpSpPr/>
+        <p:nvPr/>
+      </p:nvGrpSpPr>
+      <p:grpSpPr>
+        <a:xfrm>
+          <a:off x="0" y="0"/>
+          <a:ext cx="0" cy="0"/>
+          <a:chOff x="0" y="0"/>
+          <a:chExt cx="0" cy="0"/>
+        </a:xfrm>
+      </p:grpSpPr>
+      <p:sp>
+        <p:nvSpPr>
+          <p:cNvPr id="264" name="Google Shape;264;p19:notes"/>
+          <p:cNvSpPr txBox="1"/>
+          <p:nvPr>
+            <p:ph idx="1" type="body"/>
+          </p:nvPr>
+        </p:nvSpPr>
+        <p:spPr>
+          <a:xfrm>
+            <a:off x="685800" y="4343400"/>
+            <a:ext cx="5486400" cy="4114800"/>
+          </a:xfrm>
+          <a:prstGeom prst="rect">
+            <a:avLst/>
+          </a:prstGeom>
+        </p:spPr>
+        <p:txBody>
+          <a:bodyPr anchorCtr="0" anchor="t" bIns="91425" lIns="91425" spcFirstLastPara="1" rIns="91425" wrap="square" tIns="91425">
+            <a:noAutofit/>
+          </a:bodyPr>
+          <a:lstStyle/>
+          <a:p>
+            <a:pPr indent="0" lvl="0" marL="0" rtl="0" algn="l">
+              <a:spcBef>
+                <a:spcPts val="0"/>
+              </a:spcBef>
+              <a:spcAft>
+                <a:spcPts val="0"/>
+              </a:spcAft>
+              <a:buNone/>
+            </a:pPr>
+            <a:r>
+              <a:t/>
+            </a:r>
+            <a:endParaRPr/>
+          </a:p>
+        </p:txBody>
+      </p:sp>
+      <p:sp>
+        <p:nvSpPr>
+          <p:cNvPr id="265" name="Google Shape;265;p19:notes"/>
           <p:cNvSpPr/>
           <p:nvPr>
             <p:ph idx="2" type="sldImg"/>
@@ -12860,7 +13060,7 @@
             <a:tbl>
               <a:tblPr bandRow="1">
                 <a:noFill/>
-                <a:tableStyleId>{B0992EC9-E086-4C07-B441-F85CB0D95FCE}</a:tableStyleId>
+                <a:tableStyleId>{9745C8EF-3922-48ED-AAD0-3AA5F39FECB8}</a:tableStyleId>
               </a:tblPr>
               <a:tblGrid>
                 <a:gridCol w="1751200"/>
@@ -20353,13 +20553,6 @@
 <file path=ppt/slides/slide14.xml><?xml version="1.0" encoding="utf-8"?>
 <p:sld xmlns:a="http://schemas.openxmlformats.org/drawingml/2006/main" xmlns:r="http://schemas.openxmlformats.org/officeDocument/2006/relationships" xmlns:mc="http://schemas.openxmlformats.org/markup-compatibility/2006" xmlns:mv="urn:schemas-microsoft-com:mac:vml" xmlns:p="http://schemas.openxmlformats.org/presentationml/2006/main" xmlns:c="http://schemas.openxmlformats.org/drawingml/2006/chart" xmlns:dgm="http://schemas.openxmlformats.org/drawingml/2006/diagram" xmlns:o="urn:schemas-microsoft-com:office:office" xmlns:v="urn:schemas-microsoft-com:vml" xmlns:pvml="urn:schemas-microsoft-com:office:powerpoint" xmlns:com="http://schemas.openxmlformats.org/drawingml/2006/compatibility" xmlns:p14="http://schemas.microsoft.com/office/powerpoint/2010/main" xmlns:p15="http://schemas.microsoft.com/office/powerpoint/2012/main" xmlns:ahyp="http://schemas.microsoft.com/office/drawing/2018/hyperlinkcolor">
   <p:cSld>
-    <p:bg>
-      <p:bgPr>
-        <a:solidFill>
-          <a:srgbClr val="F3F4F6"/>
-        </a:solidFill>
-      </p:bgPr>
-    </p:bg>
     <p:spTree>
       <p:nvGrpSpPr>
         <p:cNvPr id="206" name="Shape 206"/>
@@ -20374,9 +20567,69 @@
           <a:chExt cx="0" cy="0"/>
         </a:xfrm>
       </p:grpSpPr>
+      <p:pic>
+        <p:nvPicPr>
+          <p:cNvPr id="207" name="Google Shape;207;g3913aff3a0d_0_0"/>
+          <p:cNvPicPr preferRelativeResize="0"/>
+          <p:nvPr/>
+        </p:nvPicPr>
+        <p:blipFill>
+          <a:blip r:embed="rId3">
+            <a:alphaModFix/>
+          </a:blip>
+          <a:stretch>
+            <a:fillRect/>
+          </a:stretch>
+        </p:blipFill>
+        <p:spPr>
+          <a:xfrm>
+            <a:off x="982925" y="1303500"/>
+            <a:ext cx="15821601" cy="7424425"/>
+          </a:xfrm>
+          <a:prstGeom prst="rect">
+            <a:avLst/>
+          </a:prstGeom>
+          <a:noFill/>
+          <a:ln>
+            <a:noFill/>
+          </a:ln>
+        </p:spPr>
+      </p:pic>
+    </p:spTree>
+  </p:cSld>
+  <p:clrMapOvr>
+    <a:masterClrMapping/>
+  </p:clrMapOvr>
+</p:sld>
+</file>
+
+<file path=ppt/slides/slide15.xml><?xml version="1.0" encoding="utf-8"?>
+<p:sld xmlns:a="http://schemas.openxmlformats.org/drawingml/2006/main" xmlns:r="http://schemas.openxmlformats.org/officeDocument/2006/relationships" xmlns:mc="http://schemas.openxmlformats.org/markup-compatibility/2006" xmlns:mv="urn:schemas-microsoft-com:mac:vml" xmlns:p="http://schemas.openxmlformats.org/presentationml/2006/main" xmlns:c="http://schemas.openxmlformats.org/drawingml/2006/chart" xmlns:dgm="http://schemas.openxmlformats.org/drawingml/2006/diagram" xmlns:o="urn:schemas-microsoft-com:office:office" xmlns:v="urn:schemas-microsoft-com:vml" xmlns:pvml="urn:schemas-microsoft-com:office:powerpoint" xmlns:com="http://schemas.openxmlformats.org/drawingml/2006/compatibility" xmlns:p14="http://schemas.microsoft.com/office/powerpoint/2010/main" xmlns:p15="http://schemas.microsoft.com/office/powerpoint/2012/main" xmlns:ahyp="http://schemas.microsoft.com/office/drawing/2018/hyperlinkcolor">
+  <p:cSld>
+    <p:bg>
+      <p:bgPr>
+        <a:solidFill>
+          <a:srgbClr val="F3F4F6"/>
+        </a:solidFill>
+      </p:bgPr>
+    </p:bg>
+    <p:spTree>
+      <p:nvGrpSpPr>
+        <p:cNvPr id="211" name="Shape 211"/>
+        <p:cNvGrpSpPr/>
+        <p:nvPr/>
+      </p:nvGrpSpPr>
+      <p:grpSpPr>
+        <a:xfrm>
+          <a:off x="0" y="0"/>
+          <a:ext cx="0" cy="0"/>
+          <a:chOff x="0" y="0"/>
+          <a:chExt cx="0" cy="0"/>
+        </a:xfrm>
+      </p:grpSpPr>
       <p:sp>
         <p:nvSpPr>
-          <p:cNvPr id="207" name="Google Shape;207;p14"/>
+          <p:cNvPr id="212" name="Google Shape;212;p14"/>
           <p:cNvSpPr/>
           <p:nvPr/>
         </p:nvSpPr>
@@ -20423,7 +20676,7 @@
       </p:sp>
       <p:sp>
         <p:nvSpPr>
-          <p:cNvPr id="208" name="Google Shape;208;p14"/>
+          <p:cNvPr id="213" name="Google Shape;213;p14"/>
           <p:cNvSpPr/>
           <p:nvPr/>
         </p:nvSpPr>
@@ -20470,7 +20723,7 @@
       </p:sp>
       <p:sp>
         <p:nvSpPr>
-          <p:cNvPr id="209" name="Google Shape;209;p14"/>
+          <p:cNvPr id="214" name="Google Shape;214;p14"/>
           <p:cNvSpPr/>
           <p:nvPr/>
         </p:nvSpPr>
@@ -20517,7 +20770,7 @@
       </p:sp>
       <p:sp>
         <p:nvSpPr>
-          <p:cNvPr id="210" name="Google Shape;210;p14"/>
+          <p:cNvPr id="215" name="Google Shape;215;p14"/>
           <p:cNvSpPr/>
           <p:nvPr/>
         </p:nvSpPr>
@@ -20564,7 +20817,7 @@
       </p:sp>
       <p:sp>
         <p:nvSpPr>
-          <p:cNvPr id="211" name="Google Shape;211;p14"/>
+          <p:cNvPr id="216" name="Google Shape;216;p14"/>
           <p:cNvSpPr/>
           <p:nvPr/>
         </p:nvSpPr>
@@ -20611,13 +20864,13 @@
       </p:sp>
       <p:sp>
         <p:nvSpPr>
-          <p:cNvPr id="212" name="Google Shape;212;p14"/>
+          <p:cNvPr id="217" name="Google Shape;217;p14"/>
           <p:cNvSpPr/>
           <p:nvPr/>
         </p:nvSpPr>
         <p:spPr>
           <a:xfrm>
-            <a:off x="10450513" y="2633590"/>
+            <a:off x="9498013" y="2633590"/>
             <a:ext cx="1985612" cy="1991540"/>
           </a:xfrm>
           <a:custGeom>
@@ -20658,7 +20911,7 @@
       </p:sp>
       <p:sp>
         <p:nvSpPr>
-          <p:cNvPr id="213" name="Google Shape;213;p14"/>
+          <p:cNvPr id="218" name="Google Shape;218;p14"/>
           <p:cNvSpPr/>
           <p:nvPr/>
         </p:nvSpPr>
@@ -20705,7 +20958,7 @@
       </p:sp>
       <p:sp>
         <p:nvSpPr>
-          <p:cNvPr id="214" name="Google Shape;214;p14"/>
+          <p:cNvPr id="219" name="Google Shape;219;p14"/>
           <p:cNvSpPr/>
           <p:nvPr/>
         </p:nvSpPr>
@@ -20752,7 +21005,7 @@
       </p:sp>
       <p:sp>
         <p:nvSpPr>
-          <p:cNvPr id="215" name="Google Shape;215;p14"/>
+          <p:cNvPr id="220" name="Google Shape;220;p14"/>
           <p:cNvSpPr/>
           <p:nvPr/>
         </p:nvSpPr>
@@ -20799,7 +21052,7 @@
       </p:sp>
       <p:sp>
         <p:nvSpPr>
-          <p:cNvPr id="216" name="Google Shape;216;p14"/>
+          <p:cNvPr id="221" name="Google Shape;221;p14"/>
           <p:cNvSpPr/>
           <p:nvPr/>
         </p:nvSpPr>
@@ -20846,7 +21099,7 @@
       </p:sp>
       <p:sp>
         <p:nvSpPr>
-          <p:cNvPr id="217" name="Google Shape;217;p14"/>
+          <p:cNvPr id="222" name="Google Shape;222;p14"/>
           <p:cNvSpPr/>
           <p:nvPr/>
         </p:nvSpPr>
@@ -20893,60 +21146,13 @@
       </p:sp>
       <p:sp>
         <p:nvSpPr>
-          <p:cNvPr id="218" name="Google Shape;218;p14"/>
+          <p:cNvPr id="223" name="Google Shape;223;p14"/>
           <p:cNvSpPr/>
           <p:nvPr/>
         </p:nvSpPr>
         <p:spPr>
           <a:xfrm>
-            <a:off x="3956676" y="2455772"/>
-            <a:ext cx="2833722" cy="1735654"/>
-          </a:xfrm>
-          <a:custGeom>
-            <a:rect b="b" l="l" r="r" t="t"/>
-            <a:pathLst>
-              <a:path extrusionOk="0" h="1735654" w="2833722">
-                <a:moveTo>
-                  <a:pt x="0" y="0"/>
-                </a:moveTo>
-                <a:lnTo>
-                  <a:pt x="2833722" y="0"/>
-                </a:lnTo>
-                <a:lnTo>
-                  <a:pt x="2833722" y="1735655"/>
-                </a:lnTo>
-                <a:lnTo>
-                  <a:pt x="0" y="1735655"/>
-                </a:lnTo>
-                <a:lnTo>
-                  <a:pt x="0" y="0"/>
-                </a:lnTo>
-                <a:close/>
-              </a:path>
-            </a:pathLst>
-          </a:custGeom>
-          <a:blipFill rotWithShape="1">
-            <a:blip r:embed="rId14">
-              <a:alphaModFix/>
-            </a:blip>
-            <a:stretch>
-              <a:fillRect b="0" l="0" r="0" t="0"/>
-            </a:stretch>
-          </a:blipFill>
-          <a:ln>
-            <a:noFill/>
-          </a:ln>
-        </p:spPr>
-      </p:sp>
-      <p:sp>
-        <p:nvSpPr>
-          <p:cNvPr id="219" name="Google Shape;219;p14"/>
-          <p:cNvSpPr/>
-          <p:nvPr/>
-        </p:nvSpPr>
-        <p:spPr>
-          <a:xfrm>
-            <a:off x="7546594" y="2651594"/>
+            <a:off x="5730894" y="2848519"/>
             <a:ext cx="1493345" cy="1344011"/>
           </a:xfrm>
           <a:custGeom>
@@ -20973,7 +21179,7 @@
             </a:pathLst>
           </a:custGeom>
           <a:blipFill rotWithShape="1">
-            <a:blip r:embed="rId15">
+            <a:blip r:embed="rId14">
               <a:alphaModFix/>
             </a:blip>
             <a:stretch>
@@ -20987,7 +21193,7 @@
       </p:sp>
       <p:sp>
         <p:nvSpPr>
-          <p:cNvPr id="220" name="Google Shape;220;p14"/>
+          <p:cNvPr id="224" name="Google Shape;224;p14"/>
           <p:cNvSpPr/>
           <p:nvPr/>
         </p:nvSpPr>
@@ -21020,7 +21226,7 @@
             </a:pathLst>
           </a:custGeom>
           <a:blipFill rotWithShape="1">
-            <a:blip r:embed="rId16">
+            <a:blip r:embed="rId15">
               <a:alphaModFix/>
             </a:blip>
             <a:stretch>
@@ -21034,7 +21240,7 @@
       </p:sp>
       <p:sp>
         <p:nvSpPr>
-          <p:cNvPr id="221" name="Google Shape;221;p14"/>
+          <p:cNvPr id="225" name="Google Shape;225;p14"/>
           <p:cNvSpPr txBox="1"/>
           <p:nvPr/>
         </p:nvSpPr>
@@ -21087,7 +21293,7 @@
       </p:sp>
       <p:cxnSp>
         <p:nvCxnSpPr>
-          <p:cNvPr id="222" name="Google Shape;222;p14"/>
+          <p:cNvPr id="226" name="Google Shape;226;p14"/>
           <p:cNvCxnSpPr/>
           <p:nvPr/>
         </p:nvCxnSpPr>
@@ -21119,7 +21325,182 @@
 </p:sld>
 </file>
 
-<file path=ppt/slides/slide15.xml><?xml version="1.0" encoding="utf-8"?>
+<file path=ppt/slides/slide16.xml><?xml version="1.0" encoding="utf-8"?>
+<p:sld xmlns:a="http://schemas.openxmlformats.org/drawingml/2006/main" xmlns:r="http://schemas.openxmlformats.org/officeDocument/2006/relationships" xmlns:mc="http://schemas.openxmlformats.org/markup-compatibility/2006" xmlns:mv="urn:schemas-microsoft-com:mac:vml" xmlns:p="http://schemas.openxmlformats.org/presentationml/2006/main" xmlns:c="http://schemas.openxmlformats.org/drawingml/2006/chart" xmlns:dgm="http://schemas.openxmlformats.org/drawingml/2006/diagram" xmlns:o="urn:schemas-microsoft-com:office:office" xmlns:v="urn:schemas-microsoft-com:vml" xmlns:pvml="urn:schemas-microsoft-com:office:powerpoint" xmlns:com="http://schemas.openxmlformats.org/drawingml/2006/compatibility" xmlns:p14="http://schemas.microsoft.com/office/powerpoint/2010/main" xmlns:p15="http://schemas.microsoft.com/office/powerpoint/2012/main" xmlns:ahyp="http://schemas.microsoft.com/office/drawing/2018/hyperlinkcolor">
+  <p:cSld>
+    <p:spTree>
+      <p:nvGrpSpPr>
+        <p:cNvPr id="230" name="Shape 230"/>
+        <p:cNvGrpSpPr/>
+        <p:nvPr/>
+      </p:nvGrpSpPr>
+      <p:grpSpPr>
+        <a:xfrm>
+          <a:off x="0" y="0"/>
+          <a:ext cx="0" cy="0"/>
+          <a:chOff x="0" y="0"/>
+          <a:chExt cx="0" cy="0"/>
+        </a:xfrm>
+      </p:grpSpPr>
+      <p:pic>
+        <p:nvPicPr>
+          <p:cNvPr id="231" name="Google Shape;231;g3913aff3a0d_0_3" title="Untitled diagram-2025-12-02-233548.png"/>
+          <p:cNvPicPr preferRelativeResize="0"/>
+          <p:nvPr/>
+        </p:nvPicPr>
+        <p:blipFill>
+          <a:blip r:embed="rId3">
+            <a:alphaModFix/>
+          </a:blip>
+          <a:stretch>
+            <a:fillRect/>
+          </a:stretch>
+        </p:blipFill>
+        <p:spPr>
+          <a:xfrm>
+            <a:off x="7137400" y="152400"/>
+            <a:ext cx="3348522" cy="9982203"/>
+          </a:xfrm>
+          <a:prstGeom prst="rect">
+            <a:avLst/>
+          </a:prstGeom>
+          <a:noFill/>
+          <a:ln>
+            <a:noFill/>
+          </a:ln>
+        </p:spPr>
+      </p:pic>
+      <p:sp>
+        <p:nvSpPr>
+          <p:cNvPr id="232" name="Google Shape;232;g3913aff3a0d_0_3"/>
+          <p:cNvSpPr txBox="1"/>
+          <p:nvPr/>
+        </p:nvSpPr>
+        <p:spPr>
+          <a:xfrm>
+            <a:off x="1050725" y="1782950"/>
+            <a:ext cx="5691300" cy="2284200"/>
+          </a:xfrm>
+          <a:prstGeom prst="rect">
+            <a:avLst/>
+          </a:prstGeom>
+          <a:noFill/>
+          <a:ln>
+            <a:noFill/>
+          </a:ln>
+        </p:spPr>
+        <p:txBody>
+          <a:bodyPr anchorCtr="0" anchor="t" bIns="0" lIns="0" spcFirstLastPara="1" rIns="0" wrap="square" tIns="0">
+            <a:spAutoFit/>
+          </a:bodyPr>
+          <a:lstStyle/>
+          <a:p>
+            <a:pPr indent="0" lvl="0" marL="0" marR="0" rtl="0" algn="l">
+              <a:lnSpc>
+                <a:spcPct val="112000"/>
+              </a:lnSpc>
+              <a:spcBef>
+                <a:spcPts val="0"/>
+              </a:spcBef>
+              <a:spcAft>
+                <a:spcPts val="0"/>
+              </a:spcAft>
+              <a:buNone/>
+            </a:pPr>
+            <a:r>
+              <a:rPr b="1" lang="en-US" sz="7000">
+                <a:solidFill>
+                  <a:srgbClr val="307FE2"/>
+                </a:solidFill>
+                <a:latin typeface="Montserrat"/>
+                <a:ea typeface="Montserrat"/>
+                <a:cs typeface="Montserrat"/>
+                <a:sym typeface="Montserrat"/>
+              </a:rPr>
+              <a:t>Diagrama</a:t>
+            </a:r>
+            <a:endParaRPr b="1" sz="7000">
+              <a:solidFill>
+                <a:srgbClr val="307FE2"/>
+              </a:solidFill>
+              <a:latin typeface="Montserrat"/>
+              <a:ea typeface="Montserrat"/>
+              <a:cs typeface="Montserrat"/>
+              <a:sym typeface="Montserrat"/>
+            </a:endParaRPr>
+          </a:p>
+          <a:p>
+            <a:pPr indent="0" lvl="0" marL="0" marR="0" rtl="0" algn="l">
+              <a:lnSpc>
+                <a:spcPct val="112000"/>
+              </a:lnSpc>
+              <a:spcBef>
+                <a:spcPts val="0"/>
+              </a:spcBef>
+              <a:spcAft>
+                <a:spcPts val="0"/>
+              </a:spcAft>
+              <a:buNone/>
+            </a:pPr>
+            <a:r>
+              <a:rPr b="1" lang="en-US" sz="7000">
+                <a:solidFill>
+                  <a:srgbClr val="307FE2"/>
+                </a:solidFill>
+                <a:latin typeface="Montserrat"/>
+                <a:ea typeface="Montserrat"/>
+                <a:cs typeface="Montserrat"/>
+                <a:sym typeface="Montserrat"/>
+              </a:rPr>
+              <a:t>de  agentes</a:t>
+            </a:r>
+            <a:endParaRPr b="1" sz="7000">
+              <a:solidFill>
+                <a:srgbClr val="307FE2"/>
+              </a:solidFill>
+              <a:latin typeface="Montserrat"/>
+              <a:ea typeface="Montserrat"/>
+              <a:cs typeface="Montserrat"/>
+              <a:sym typeface="Montserrat"/>
+            </a:endParaRPr>
+          </a:p>
+        </p:txBody>
+      </p:sp>
+      <p:cxnSp>
+        <p:nvCxnSpPr>
+          <p:cNvPr id="233" name="Google Shape;233;g3913aff3a0d_0_3"/>
+          <p:cNvCxnSpPr/>
+          <p:nvPr/>
+        </p:nvCxnSpPr>
+        <p:spPr>
+          <a:xfrm>
+            <a:off x="1050725" y="4100975"/>
+            <a:ext cx="4620300" cy="0"/>
+          </a:xfrm>
+          <a:prstGeom prst="straightConnector1">
+            <a:avLst/>
+          </a:prstGeom>
+          <a:noFill/>
+          <a:ln cap="flat" cmpd="sng" w="19050">
+            <a:solidFill>
+              <a:srgbClr val="307FE2"/>
+            </a:solidFill>
+            <a:prstDash val="solid"/>
+            <a:round/>
+            <a:headEnd len="sm" w="sm" type="none"/>
+            <a:tailEnd len="sm" w="sm" type="none"/>
+          </a:ln>
+        </p:spPr>
+      </p:cxnSp>
+    </p:spTree>
+  </p:cSld>
+  <p:clrMapOvr>
+    <a:masterClrMapping/>
+  </p:clrMapOvr>
+</p:sld>
+</file>
+
+<file path=ppt/slides/slide17.xml><?xml version="1.0" encoding="utf-8"?>
 <p:sld xmlns:a="http://schemas.openxmlformats.org/drawingml/2006/main" xmlns:r="http://schemas.openxmlformats.org/officeDocument/2006/relationships" xmlns:mc="http://schemas.openxmlformats.org/markup-compatibility/2006" xmlns:mv="urn:schemas-microsoft-com:mac:vml" xmlns:p="http://schemas.openxmlformats.org/presentationml/2006/main" xmlns:c="http://schemas.openxmlformats.org/drawingml/2006/chart" xmlns:dgm="http://schemas.openxmlformats.org/drawingml/2006/diagram" xmlns:o="urn:schemas-microsoft-com:office:office" xmlns:v="urn:schemas-microsoft-com:vml" xmlns:pvml="urn:schemas-microsoft-com:office:powerpoint" xmlns:com="http://schemas.openxmlformats.org/drawingml/2006/compatibility" xmlns:p14="http://schemas.microsoft.com/office/powerpoint/2010/main" xmlns:p15="http://schemas.microsoft.com/office/powerpoint/2012/main" xmlns:ahyp="http://schemas.microsoft.com/office/drawing/2018/hyperlinkcolor">
   <p:cSld>
     <p:bg>
@@ -21131,7 +21512,7 @@
     </p:bg>
     <p:spTree>
       <p:nvGrpSpPr>
-        <p:cNvPr id="226" name="Shape 226"/>
+        <p:cNvPr id="237" name="Shape 237"/>
         <p:cNvGrpSpPr/>
         <p:nvPr/>
       </p:nvGrpSpPr>
@@ -21145,7 +21526,7 @@
       </p:grpSpPr>
       <p:sp>
         <p:nvSpPr>
-          <p:cNvPr id="227" name="Google Shape;227;p15"/>
+          <p:cNvPr id="238" name="Google Shape;238;p15"/>
           <p:cNvSpPr txBox="1"/>
           <p:nvPr/>
         </p:nvSpPr>
@@ -21230,7 +21611,7 @@
 </p:sld>
 </file>
 
-<file path=ppt/slides/slide16.xml><?xml version="1.0" encoding="utf-8"?>
+<file path=ppt/slides/slide18.xml><?xml version="1.0" encoding="utf-8"?>
 <p:sld xmlns:a="http://schemas.openxmlformats.org/drawingml/2006/main" xmlns:r="http://schemas.openxmlformats.org/officeDocument/2006/relationships" xmlns:mc="http://schemas.openxmlformats.org/markup-compatibility/2006" xmlns:mv="urn:schemas-microsoft-com:mac:vml" xmlns:p="http://schemas.openxmlformats.org/presentationml/2006/main" xmlns:c="http://schemas.openxmlformats.org/drawingml/2006/chart" xmlns:dgm="http://schemas.openxmlformats.org/drawingml/2006/diagram" xmlns:o="urn:schemas-microsoft-com:office:office" xmlns:v="urn:schemas-microsoft-com:vml" xmlns:pvml="urn:schemas-microsoft-com:office:powerpoint" xmlns:com="http://schemas.openxmlformats.org/drawingml/2006/compatibility" xmlns:p14="http://schemas.microsoft.com/office/powerpoint/2010/main" xmlns:p15="http://schemas.microsoft.com/office/powerpoint/2012/main" xmlns:ahyp="http://schemas.microsoft.com/office/drawing/2018/hyperlinkcolor">
   <p:cSld>
     <p:bg>
@@ -21242,7 +21623,7 @@
     </p:bg>
     <p:spTree>
       <p:nvGrpSpPr>
-        <p:cNvPr id="231" name="Shape 231"/>
+        <p:cNvPr id="242" name="Shape 242"/>
         <p:cNvGrpSpPr/>
         <p:nvPr/>
       </p:nvGrpSpPr>
@@ -21256,7 +21637,7 @@
       </p:grpSpPr>
       <p:sp>
         <p:nvSpPr>
-          <p:cNvPr id="232" name="Google Shape;232;p16"/>
+          <p:cNvPr id="243" name="Google Shape;243;p16"/>
           <p:cNvSpPr/>
           <p:nvPr/>
         </p:nvSpPr>
@@ -21303,7 +21684,7 @@
       </p:sp>
       <p:sp>
         <p:nvSpPr>
-          <p:cNvPr id="233" name="Google Shape;233;p16"/>
+          <p:cNvPr id="244" name="Google Shape;244;p16"/>
           <p:cNvSpPr txBox="1"/>
           <p:nvPr/>
         </p:nvSpPr>
@@ -21356,7 +21737,7 @@
       </p:sp>
       <p:cxnSp>
         <p:nvCxnSpPr>
-          <p:cNvPr id="234" name="Google Shape;234;p16"/>
+          <p:cNvPr id="245" name="Google Shape;245;p16"/>
           <p:cNvCxnSpPr/>
           <p:nvPr/>
         </p:nvCxnSpPr>
@@ -21382,7 +21763,7 @@
       </p:cxnSp>
       <p:sp>
         <p:nvSpPr>
-          <p:cNvPr id="235" name="Google Shape;235;p16"/>
+          <p:cNvPr id="246" name="Google Shape;246;p16"/>
           <p:cNvSpPr txBox="1"/>
           <p:nvPr/>
         </p:nvSpPr>
@@ -21441,7 +21822,7 @@
 </p:sld>
 </file>
 
-<file path=ppt/slides/slide17.xml><?xml version="1.0" encoding="utf-8"?>
+<file path=ppt/slides/slide19.xml><?xml version="1.0" encoding="utf-8"?>
 <p:sld xmlns:a="http://schemas.openxmlformats.org/drawingml/2006/main" xmlns:r="http://schemas.openxmlformats.org/officeDocument/2006/relationships" xmlns:mc="http://schemas.openxmlformats.org/markup-compatibility/2006" xmlns:mv="urn:schemas-microsoft-com:mac:vml" xmlns:p="http://schemas.openxmlformats.org/presentationml/2006/main" xmlns:c="http://schemas.openxmlformats.org/drawingml/2006/chart" xmlns:dgm="http://schemas.openxmlformats.org/drawingml/2006/diagram" xmlns:o="urn:schemas-microsoft-com:office:office" xmlns:v="urn:schemas-microsoft-com:vml" xmlns:pvml="urn:schemas-microsoft-com:office:powerpoint" xmlns:com="http://schemas.openxmlformats.org/drawingml/2006/compatibility" xmlns:p14="http://schemas.microsoft.com/office/powerpoint/2010/main" xmlns:p15="http://schemas.microsoft.com/office/powerpoint/2012/main" xmlns:ahyp="http://schemas.microsoft.com/office/drawing/2018/hyperlinkcolor">
   <p:cSld>
     <p:bg>
@@ -21453,7 +21834,7 @@
     </p:bg>
     <p:spTree>
       <p:nvGrpSpPr>
-        <p:cNvPr id="239" name="Shape 239"/>
+        <p:cNvPr id="250" name="Shape 250"/>
         <p:cNvGrpSpPr/>
         <p:nvPr/>
       </p:nvGrpSpPr>
@@ -21467,7 +21848,7 @@
       </p:grpSpPr>
       <p:sp>
         <p:nvSpPr>
-          <p:cNvPr id="240" name="Google Shape;240;p17"/>
+          <p:cNvPr id="251" name="Google Shape;251;p17"/>
           <p:cNvSpPr txBox="1"/>
           <p:nvPr/>
         </p:nvSpPr>
@@ -21520,7 +21901,7 @@
       </p:sp>
       <p:cxnSp>
         <p:nvCxnSpPr>
-          <p:cNvPr id="241" name="Google Shape;241;p17"/>
+          <p:cNvPr id="252" name="Google Shape;252;p17"/>
           <p:cNvCxnSpPr/>
           <p:nvPr/>
         </p:nvCxnSpPr>
@@ -21546,7 +21927,7 @@
       </p:cxnSp>
       <p:sp>
         <p:nvSpPr>
-          <p:cNvPr id="242" name="Google Shape;242;p17"/>
+          <p:cNvPr id="253" name="Google Shape;253;p17"/>
           <p:cNvSpPr/>
           <p:nvPr/>
         </p:nvSpPr>
@@ -21593,14 +21974,14 @@
       </p:sp>
       <p:sp>
         <p:nvSpPr>
-          <p:cNvPr id="243" name="Google Shape;243;p17"/>
+          <p:cNvPr id="254" name="Google Shape;254;p17"/>
           <p:cNvSpPr txBox="1"/>
           <p:nvPr/>
         </p:nvSpPr>
         <p:spPr>
           <a:xfrm>
             <a:off x="1028700" y="3851561"/>
-            <a:ext cx="8300027" cy="2133600"/>
+            <a:ext cx="8300100" cy="2154900"/>
           </a:xfrm>
           <a:prstGeom prst="rect">
             <a:avLst/>
@@ -21675,7 +22056,7 @@
                 <a:cs typeface="Montserrat"/>
                 <a:sym typeface="Montserrat"/>
               </a:rPr>
-              <a:t>Errores desconocidos dentro de la implementación del sistema.</a:t>
+              <a:t>Errores dentro de la implementación del sistema.</a:t>
             </a:r>
             <a:endParaRPr/>
           </a:p>
@@ -21730,325 +22111,6 @@
             <a:endParaRPr b="0" i="0" sz="2000" u="none" cap="none" strike="noStrike">
               <a:solidFill>
                 <a:srgbClr val="307FE2"/>
-              </a:solidFill>
-              <a:latin typeface="Montserrat"/>
-              <a:ea typeface="Montserrat"/>
-              <a:cs typeface="Montserrat"/>
-              <a:sym typeface="Montserrat"/>
-            </a:endParaRPr>
-          </a:p>
-        </p:txBody>
-      </p:sp>
-    </p:spTree>
-  </p:cSld>
-  <p:clrMapOvr>
-    <a:masterClrMapping/>
-  </p:clrMapOvr>
-</p:sld>
-</file>
-
-<file path=ppt/slides/slide18.xml><?xml version="1.0" encoding="utf-8"?>
-<p:sld xmlns:a="http://schemas.openxmlformats.org/drawingml/2006/main" xmlns:r="http://schemas.openxmlformats.org/officeDocument/2006/relationships" xmlns:mc="http://schemas.openxmlformats.org/markup-compatibility/2006" xmlns:mv="urn:schemas-microsoft-com:mac:vml" xmlns:p="http://schemas.openxmlformats.org/presentationml/2006/main" xmlns:c="http://schemas.openxmlformats.org/drawingml/2006/chart" xmlns:dgm="http://schemas.openxmlformats.org/drawingml/2006/diagram" xmlns:o="urn:schemas-microsoft-com:office:office" xmlns:v="urn:schemas-microsoft-com:vml" xmlns:pvml="urn:schemas-microsoft-com:office:powerpoint" xmlns:com="http://schemas.openxmlformats.org/drawingml/2006/compatibility" xmlns:p14="http://schemas.microsoft.com/office/powerpoint/2010/main" xmlns:p15="http://schemas.microsoft.com/office/powerpoint/2012/main" xmlns:ahyp="http://schemas.microsoft.com/office/drawing/2018/hyperlinkcolor">
-  <p:cSld>
-    <p:bg>
-      <p:bgPr>
-        <a:solidFill>
-          <a:srgbClr val="F3F4F6"/>
-        </a:solidFill>
-      </p:bgPr>
-    </p:bg>
-    <p:spTree>
-      <p:nvGrpSpPr>
-        <p:cNvPr id="247" name="Shape 247"/>
-        <p:cNvGrpSpPr/>
-        <p:nvPr/>
-      </p:nvGrpSpPr>
-      <p:grpSpPr>
-        <a:xfrm>
-          <a:off x="0" y="0"/>
-          <a:ext cx="0" cy="0"/>
-          <a:chOff x="0" y="0"/>
-          <a:chExt cx="0" cy="0"/>
-        </a:xfrm>
-      </p:grpSpPr>
-      <p:sp>
-        <p:nvSpPr>
-          <p:cNvPr id="248" name="Google Shape;248;p18"/>
-          <p:cNvSpPr/>
-          <p:nvPr/>
-        </p:nvSpPr>
-        <p:spPr>
-          <a:xfrm>
-            <a:off x="10429875" y="0"/>
-            <a:ext cx="7858125" cy="10287000"/>
-          </a:xfrm>
-          <a:custGeom>
-            <a:rect b="b" l="l" r="r" t="t"/>
-            <a:pathLst>
-              <a:path extrusionOk="0" h="1593725" w="1217429">
-                <a:moveTo>
-                  <a:pt x="0" y="0"/>
-                </a:moveTo>
-                <a:lnTo>
-                  <a:pt x="1217429" y="0"/>
-                </a:lnTo>
-                <a:lnTo>
-                  <a:pt x="1217429" y="1593725"/>
-                </a:lnTo>
-                <a:lnTo>
-                  <a:pt x="0" y="1593725"/>
-                </a:lnTo>
-                <a:close/>
-              </a:path>
-            </a:pathLst>
-          </a:custGeom>
-          <a:blipFill rotWithShape="1">
-            <a:blip r:embed="rId3">
-              <a:alphaModFix/>
-            </a:blip>
-            <a:stretch>
-              <a:fillRect b="-253" l="0" r="0" t="-253"/>
-            </a:stretch>
-          </a:blipFill>
-          <a:ln>
-            <a:noFill/>
-          </a:ln>
-        </p:spPr>
-      </p:sp>
-      <p:sp>
-        <p:nvSpPr>
-          <p:cNvPr id="249" name="Google Shape;249;p18"/>
-          <p:cNvSpPr txBox="1"/>
-          <p:nvPr/>
-        </p:nvSpPr>
-        <p:spPr>
-          <a:xfrm>
-            <a:off x="1181100" y="1228725"/>
-            <a:ext cx="8882587" cy="1014097"/>
-          </a:xfrm>
-          <a:prstGeom prst="rect">
-            <a:avLst/>
-          </a:prstGeom>
-          <a:noFill/>
-          <a:ln>
-            <a:noFill/>
-          </a:ln>
-        </p:spPr>
-        <p:txBody>
-          <a:bodyPr anchorCtr="0" anchor="t" bIns="0" lIns="0" spcFirstLastPara="1" rIns="0" wrap="square" tIns="0">
-            <a:spAutoFit/>
-          </a:bodyPr>
-          <a:lstStyle/>
-          <a:p>
-            <a:pPr indent="0" lvl="0" marL="0" marR="0" rtl="0" algn="l">
-              <a:lnSpc>
-                <a:spcPct val="112000"/>
-              </a:lnSpc>
-              <a:spcBef>
-                <a:spcPts val="0"/>
-              </a:spcBef>
-              <a:spcAft>
-                <a:spcPts val="0"/>
-              </a:spcAft>
-              <a:buNone/>
-            </a:pPr>
-            <a:r>
-              <a:rPr b="1" i="0" lang="en-US" sz="7000" u="none" cap="none" strike="noStrike">
-                <a:solidFill>
-                  <a:srgbClr val="307FE2"/>
-                </a:solidFill>
-                <a:latin typeface="Montserrat"/>
-                <a:ea typeface="Montserrat"/>
-                <a:cs typeface="Montserrat"/>
-                <a:sym typeface="Montserrat"/>
-              </a:rPr>
-              <a:t>Conclusiones</a:t>
-            </a:r>
-            <a:endParaRPr/>
-          </a:p>
-        </p:txBody>
-      </p:sp>
-      <p:cxnSp>
-        <p:nvCxnSpPr>
-          <p:cNvPr id="250" name="Google Shape;250;p18"/>
-          <p:cNvCxnSpPr/>
-          <p:nvPr/>
-        </p:nvCxnSpPr>
-        <p:spPr>
-          <a:xfrm>
-            <a:off x="1157612" y="2393767"/>
-            <a:ext cx="7211120" cy="0"/>
-          </a:xfrm>
-          <a:prstGeom prst="straightConnector1">
-            <a:avLst/>
-          </a:prstGeom>
-          <a:noFill/>
-          <a:ln cap="flat" cmpd="sng" w="19050">
-            <a:solidFill>
-              <a:srgbClr val="307FE2"/>
-            </a:solidFill>
-            <a:prstDash val="solid"/>
-            <a:round/>
-            <a:headEnd len="sm" w="sm" type="none"/>
-            <a:tailEnd len="sm" w="sm" type="none"/>
-          </a:ln>
-        </p:spPr>
-      </p:cxnSp>
-      <p:sp>
-        <p:nvSpPr>
-          <p:cNvPr id="251" name="Google Shape;251;p18"/>
-          <p:cNvSpPr txBox="1"/>
-          <p:nvPr/>
-        </p:nvSpPr>
-        <p:spPr>
-          <a:xfrm>
-            <a:off x="1157612" y="2997599"/>
-            <a:ext cx="8811362" cy="1828800"/>
-          </a:xfrm>
-          <a:prstGeom prst="rect">
-            <a:avLst/>
-          </a:prstGeom>
-          <a:noFill/>
-          <a:ln>
-            <a:noFill/>
-          </a:ln>
-        </p:spPr>
-        <p:txBody>
-          <a:bodyPr anchorCtr="0" anchor="t" bIns="0" lIns="0" spcFirstLastPara="1" rIns="0" wrap="square" tIns="0">
-            <a:spAutoFit/>
-          </a:bodyPr>
-          <a:lstStyle/>
-          <a:p>
-            <a:pPr indent="0" lvl="0" marL="0" marR="0" rtl="0" algn="just">
-              <a:lnSpc>
-                <a:spcPct val="120000"/>
-              </a:lnSpc>
-              <a:spcBef>
-                <a:spcPts val="0"/>
-              </a:spcBef>
-              <a:spcAft>
-                <a:spcPts val="0"/>
-              </a:spcAft>
-              <a:buNone/>
-            </a:pPr>
-            <a:r>
-              <a:rPr b="0" i="0" lang="en-US" sz="2000" u="none" cap="none" strike="noStrike">
-                <a:solidFill>
-                  <a:srgbClr val="307FE2"/>
-                </a:solidFill>
-                <a:latin typeface="Montserrat"/>
-                <a:ea typeface="Montserrat"/>
-                <a:cs typeface="Montserrat"/>
-                <a:sym typeface="Montserrat"/>
-              </a:rPr>
-              <a:t>La evaluación asistida por IA ha demostrado ser una solución eficaz para los desafíos actuales en la corrección de evaluaciones. Este enfoque no solo mejora la precisión y diversidad en la calificación, sino que también permite a los docentes mantener el control sobre el proceso educativo mientras se benefician de la asistencia tecnológica.</a:t>
-            </a:r>
-            <a:endParaRPr/>
-          </a:p>
-        </p:txBody>
-      </p:sp>
-    </p:spTree>
-  </p:cSld>
-  <p:clrMapOvr>
-    <a:masterClrMapping/>
-  </p:clrMapOvr>
-</p:sld>
-</file>
-
-<file path=ppt/slides/slide19.xml><?xml version="1.0" encoding="utf-8"?>
-<p:sld xmlns:a="http://schemas.openxmlformats.org/drawingml/2006/main" xmlns:r="http://schemas.openxmlformats.org/officeDocument/2006/relationships" xmlns:mc="http://schemas.openxmlformats.org/markup-compatibility/2006" xmlns:mv="urn:schemas-microsoft-com:mac:vml" xmlns:p="http://schemas.openxmlformats.org/presentationml/2006/main" xmlns:c="http://schemas.openxmlformats.org/drawingml/2006/chart" xmlns:dgm="http://schemas.openxmlformats.org/drawingml/2006/diagram" xmlns:o="urn:schemas-microsoft-com:office:office" xmlns:v="urn:schemas-microsoft-com:vml" xmlns:pvml="urn:schemas-microsoft-com:office:powerpoint" xmlns:com="http://schemas.openxmlformats.org/drawingml/2006/compatibility" xmlns:p14="http://schemas.microsoft.com/office/powerpoint/2010/main" xmlns:p15="http://schemas.microsoft.com/office/powerpoint/2012/main" xmlns:ahyp="http://schemas.microsoft.com/office/drawing/2018/hyperlinkcolor">
-  <p:cSld>
-    <p:bg>
-      <p:bgPr>
-        <a:solidFill>
-          <a:srgbClr val="F3F4F6"/>
-        </a:solidFill>
-      </p:bgPr>
-    </p:bg>
-    <p:spTree>
-      <p:nvGrpSpPr>
-        <p:cNvPr id="255" name="Shape 255"/>
-        <p:cNvGrpSpPr/>
-        <p:nvPr/>
-      </p:nvGrpSpPr>
-      <p:grpSpPr>
-        <a:xfrm>
-          <a:off x="0" y="0"/>
-          <a:ext cx="0" cy="0"/>
-          <a:chOff x="0" y="0"/>
-          <a:chExt cx="0" cy="0"/>
-        </a:xfrm>
-      </p:grpSpPr>
-      <p:sp>
-        <p:nvSpPr>
-          <p:cNvPr id="256" name="Google Shape;256;p19"/>
-          <p:cNvSpPr txBox="1"/>
-          <p:nvPr/>
-        </p:nvSpPr>
-        <p:spPr>
-          <a:xfrm>
-            <a:off x="3430246" y="3669664"/>
-            <a:ext cx="11427508" cy="2995297"/>
-          </a:xfrm>
-          <a:prstGeom prst="rect">
-            <a:avLst/>
-          </a:prstGeom>
-          <a:noFill/>
-          <a:ln>
-            <a:noFill/>
-          </a:ln>
-        </p:spPr>
-        <p:txBody>
-          <a:bodyPr anchorCtr="0" anchor="t" bIns="0" lIns="0" spcFirstLastPara="1" rIns="0" wrap="square" tIns="0">
-            <a:spAutoFit/>
-          </a:bodyPr>
-          <a:lstStyle/>
-          <a:p>
-            <a:pPr indent="0" lvl="0" marL="0" marR="0" rtl="0" algn="l">
-              <a:lnSpc>
-                <a:spcPct val="112000"/>
-              </a:lnSpc>
-              <a:spcBef>
-                <a:spcPts val="0"/>
-              </a:spcBef>
-              <a:spcAft>
-                <a:spcPts val="0"/>
-              </a:spcAft>
-              <a:buNone/>
-            </a:pPr>
-            <a:r>
-              <a:rPr b="1" i="0" lang="en-US" sz="7000" u="none" cap="none" strike="noStrike">
-                <a:solidFill>
-                  <a:srgbClr val="0A6ED8"/>
-                </a:solidFill>
-                <a:latin typeface="Montserrat"/>
-                <a:ea typeface="Montserrat"/>
-                <a:cs typeface="Montserrat"/>
-                <a:sym typeface="Montserrat"/>
-              </a:rPr>
-              <a:t>PREGUNTAS DE LA COMISIÓN</a:t>
-            </a:r>
-            <a:endParaRPr/>
-          </a:p>
-          <a:p>
-            <a:pPr indent="0" lvl="0" marL="0" marR="0" rtl="0" algn="l">
-              <a:lnSpc>
-                <a:spcPct val="112000"/>
-              </a:lnSpc>
-              <a:spcBef>
-                <a:spcPts val="0"/>
-              </a:spcBef>
-              <a:spcAft>
-                <a:spcPts val="0"/>
-              </a:spcAft>
-              <a:buNone/>
-            </a:pPr>
-            <a:r>
-              <a:t/>
-            </a:r>
-            <a:endParaRPr b="1" i="0" sz="7000" u="none" cap="none" strike="noStrike">
-              <a:solidFill>
-                <a:srgbClr val="0A6ED8"/>
               </a:solidFill>
               <a:latin typeface="Montserrat"/>
               <a:ea typeface="Montserrat"/>
@@ -22840,9 +22902,9 @@
         <p:grpSpPr>
           <a:xfrm>
             <a:off x="4268345" y="1021556"/>
-            <a:ext cx="6641360" cy="2064544"/>
+            <a:ext cx="6641325" cy="2326144"/>
             <a:chOff x="0" y="-9525"/>
-            <a:chExt cx="8855147" cy="2752725"/>
+            <a:chExt cx="8855100" cy="3101525"/>
           </a:xfrm>
         </p:grpSpPr>
         <p:sp>
@@ -22907,7 +22969,7 @@
           <p:spPr>
             <a:xfrm>
               <a:off x="0" y="711200"/>
-              <a:ext cx="8855147" cy="2032000"/>
+              <a:ext cx="8855100" cy="2380800"/>
             </a:xfrm>
             <a:prstGeom prst="rect">
               <a:avLst/>
@@ -22982,7 +23044,79 @@
                   <a:cs typeface="Montserrat"/>
                   <a:sym typeface="Montserrat"/>
                 </a:rPr>
-                <a:t>Creación y mantención  de  arquitectura  en la nube, Asignacion de tareas, creacion de endpoints, Creacion de pipelines de despliegue </a:t>
+                <a:t>Creación y mantención  de  arquitectura  en la nube, </a:t>
+              </a:r>
+              <a:r>
+                <a:rPr b="1" lang="en-US" sz="2000">
+                  <a:solidFill>
+                    <a:srgbClr val="FFFFFF"/>
+                  </a:solidFill>
+                  <a:latin typeface="Montserrat"/>
+                  <a:ea typeface="Montserrat"/>
+                  <a:cs typeface="Montserrat"/>
+                  <a:sym typeface="Montserrat"/>
+                </a:rPr>
+                <a:t>a</a:t>
+              </a:r>
+              <a:r>
+                <a:rPr b="1" i="0" lang="en-US" sz="2000" u="none" cap="none" strike="noStrike">
+                  <a:solidFill>
+                    <a:srgbClr val="FFFFFF"/>
+                  </a:solidFill>
+                  <a:latin typeface="Montserrat"/>
+                  <a:ea typeface="Montserrat"/>
+                  <a:cs typeface="Montserrat"/>
+                  <a:sym typeface="Montserrat"/>
+                </a:rPr>
+                <a:t>signaci</a:t>
+              </a:r>
+              <a:r>
+                <a:rPr b="1" lang="en-US" sz="2000">
+                  <a:solidFill>
+                    <a:srgbClr val="FFFFFF"/>
+                  </a:solidFill>
+                  <a:latin typeface="Montserrat"/>
+                  <a:ea typeface="Montserrat"/>
+                  <a:cs typeface="Montserrat"/>
+                  <a:sym typeface="Montserrat"/>
+                </a:rPr>
+                <a:t>ó</a:t>
+              </a:r>
+              <a:r>
+                <a:rPr b="1" i="0" lang="en-US" sz="2000" u="none" cap="none" strike="noStrike">
+                  <a:solidFill>
+                    <a:srgbClr val="FFFFFF"/>
+                  </a:solidFill>
+                  <a:latin typeface="Montserrat"/>
+                  <a:ea typeface="Montserrat"/>
+                  <a:cs typeface="Montserrat"/>
+                  <a:sym typeface="Montserrat"/>
+                </a:rPr>
+                <a:t>n de tareas, creacion de endpoints, </a:t>
+              </a:r>
+              <a:r>
+                <a:rPr b="1" lang="en-US" sz="2000">
+                  <a:solidFill>
+                    <a:srgbClr val="FFFFFF"/>
+                  </a:solidFill>
+                  <a:latin typeface="Montserrat"/>
+                  <a:ea typeface="Montserrat"/>
+                  <a:cs typeface="Montserrat"/>
+                  <a:sym typeface="Montserrat"/>
+                </a:rPr>
+                <a:t>creación</a:t>
+              </a:r>
+              <a:r>
+                <a:rPr b="1" i="0" lang="en-US" sz="2000" u="none" cap="none" strike="noStrike">
+                  <a:solidFill>
+                    <a:srgbClr val="FFFFFF"/>
+                  </a:solidFill>
+                  <a:latin typeface="Montserrat"/>
+                  <a:ea typeface="Montserrat"/>
+                  <a:cs typeface="Montserrat"/>
+                  <a:sym typeface="Montserrat"/>
+                </a:rPr>
+                <a:t> de pipelines de despliegue </a:t>
               </a:r>
               <a:endParaRPr/>
             </a:p>
@@ -23324,6 +23458,325 @@
 </p:sld>
 </file>
 
+<file path=ppt/slides/slide20.xml><?xml version="1.0" encoding="utf-8"?>
+<p:sld xmlns:a="http://schemas.openxmlformats.org/drawingml/2006/main" xmlns:r="http://schemas.openxmlformats.org/officeDocument/2006/relationships" xmlns:mc="http://schemas.openxmlformats.org/markup-compatibility/2006" xmlns:mv="urn:schemas-microsoft-com:mac:vml" xmlns:p="http://schemas.openxmlformats.org/presentationml/2006/main" xmlns:c="http://schemas.openxmlformats.org/drawingml/2006/chart" xmlns:dgm="http://schemas.openxmlformats.org/drawingml/2006/diagram" xmlns:o="urn:schemas-microsoft-com:office:office" xmlns:v="urn:schemas-microsoft-com:vml" xmlns:pvml="urn:schemas-microsoft-com:office:powerpoint" xmlns:com="http://schemas.openxmlformats.org/drawingml/2006/compatibility" xmlns:p14="http://schemas.microsoft.com/office/powerpoint/2010/main" xmlns:p15="http://schemas.microsoft.com/office/powerpoint/2012/main" xmlns:ahyp="http://schemas.microsoft.com/office/drawing/2018/hyperlinkcolor">
+  <p:cSld>
+    <p:bg>
+      <p:bgPr>
+        <a:solidFill>
+          <a:srgbClr val="F3F4F6"/>
+        </a:solidFill>
+      </p:bgPr>
+    </p:bg>
+    <p:spTree>
+      <p:nvGrpSpPr>
+        <p:cNvPr id="258" name="Shape 258"/>
+        <p:cNvGrpSpPr/>
+        <p:nvPr/>
+      </p:nvGrpSpPr>
+      <p:grpSpPr>
+        <a:xfrm>
+          <a:off x="0" y="0"/>
+          <a:ext cx="0" cy="0"/>
+          <a:chOff x="0" y="0"/>
+          <a:chExt cx="0" cy="0"/>
+        </a:xfrm>
+      </p:grpSpPr>
+      <p:sp>
+        <p:nvSpPr>
+          <p:cNvPr id="259" name="Google Shape;259;p18"/>
+          <p:cNvSpPr/>
+          <p:nvPr/>
+        </p:nvSpPr>
+        <p:spPr>
+          <a:xfrm>
+            <a:off x="10429875" y="0"/>
+            <a:ext cx="7858125" cy="10287000"/>
+          </a:xfrm>
+          <a:custGeom>
+            <a:rect b="b" l="l" r="r" t="t"/>
+            <a:pathLst>
+              <a:path extrusionOk="0" h="1593725" w="1217429">
+                <a:moveTo>
+                  <a:pt x="0" y="0"/>
+                </a:moveTo>
+                <a:lnTo>
+                  <a:pt x="1217429" y="0"/>
+                </a:lnTo>
+                <a:lnTo>
+                  <a:pt x="1217429" y="1593725"/>
+                </a:lnTo>
+                <a:lnTo>
+                  <a:pt x="0" y="1593725"/>
+                </a:lnTo>
+                <a:close/>
+              </a:path>
+            </a:pathLst>
+          </a:custGeom>
+          <a:blipFill rotWithShape="1">
+            <a:blip r:embed="rId3">
+              <a:alphaModFix/>
+            </a:blip>
+            <a:stretch>
+              <a:fillRect b="-253" l="0" r="0" t="-253"/>
+            </a:stretch>
+          </a:blipFill>
+          <a:ln>
+            <a:noFill/>
+          </a:ln>
+        </p:spPr>
+      </p:sp>
+      <p:sp>
+        <p:nvSpPr>
+          <p:cNvPr id="260" name="Google Shape;260;p18"/>
+          <p:cNvSpPr txBox="1"/>
+          <p:nvPr/>
+        </p:nvSpPr>
+        <p:spPr>
+          <a:xfrm>
+            <a:off x="1181100" y="1228725"/>
+            <a:ext cx="8882587" cy="1014097"/>
+          </a:xfrm>
+          <a:prstGeom prst="rect">
+            <a:avLst/>
+          </a:prstGeom>
+          <a:noFill/>
+          <a:ln>
+            <a:noFill/>
+          </a:ln>
+        </p:spPr>
+        <p:txBody>
+          <a:bodyPr anchorCtr="0" anchor="t" bIns="0" lIns="0" spcFirstLastPara="1" rIns="0" wrap="square" tIns="0">
+            <a:spAutoFit/>
+          </a:bodyPr>
+          <a:lstStyle/>
+          <a:p>
+            <a:pPr indent="0" lvl="0" marL="0" marR="0" rtl="0" algn="l">
+              <a:lnSpc>
+                <a:spcPct val="112000"/>
+              </a:lnSpc>
+              <a:spcBef>
+                <a:spcPts val="0"/>
+              </a:spcBef>
+              <a:spcAft>
+                <a:spcPts val="0"/>
+              </a:spcAft>
+              <a:buNone/>
+            </a:pPr>
+            <a:r>
+              <a:rPr b="1" i="0" lang="en-US" sz="7000" u="none" cap="none" strike="noStrike">
+                <a:solidFill>
+                  <a:srgbClr val="307FE2"/>
+                </a:solidFill>
+                <a:latin typeface="Montserrat"/>
+                <a:ea typeface="Montserrat"/>
+                <a:cs typeface="Montserrat"/>
+                <a:sym typeface="Montserrat"/>
+              </a:rPr>
+              <a:t>Conclusiones</a:t>
+            </a:r>
+            <a:endParaRPr/>
+          </a:p>
+        </p:txBody>
+      </p:sp>
+      <p:cxnSp>
+        <p:nvCxnSpPr>
+          <p:cNvPr id="261" name="Google Shape;261;p18"/>
+          <p:cNvCxnSpPr/>
+          <p:nvPr/>
+        </p:nvCxnSpPr>
+        <p:spPr>
+          <a:xfrm>
+            <a:off x="1157612" y="2393767"/>
+            <a:ext cx="7211120" cy="0"/>
+          </a:xfrm>
+          <a:prstGeom prst="straightConnector1">
+            <a:avLst/>
+          </a:prstGeom>
+          <a:noFill/>
+          <a:ln cap="flat" cmpd="sng" w="19050">
+            <a:solidFill>
+              <a:srgbClr val="307FE2"/>
+            </a:solidFill>
+            <a:prstDash val="solid"/>
+            <a:round/>
+            <a:headEnd len="sm" w="sm" type="none"/>
+            <a:tailEnd len="sm" w="sm" type="none"/>
+          </a:ln>
+        </p:spPr>
+      </p:cxnSp>
+      <p:sp>
+        <p:nvSpPr>
+          <p:cNvPr id="262" name="Google Shape;262;p18"/>
+          <p:cNvSpPr txBox="1"/>
+          <p:nvPr/>
+        </p:nvSpPr>
+        <p:spPr>
+          <a:xfrm>
+            <a:off x="1157612" y="2997599"/>
+            <a:ext cx="8811362" cy="1828800"/>
+          </a:xfrm>
+          <a:prstGeom prst="rect">
+            <a:avLst/>
+          </a:prstGeom>
+          <a:noFill/>
+          <a:ln>
+            <a:noFill/>
+          </a:ln>
+        </p:spPr>
+        <p:txBody>
+          <a:bodyPr anchorCtr="0" anchor="t" bIns="0" lIns="0" spcFirstLastPara="1" rIns="0" wrap="square" tIns="0">
+            <a:spAutoFit/>
+          </a:bodyPr>
+          <a:lstStyle/>
+          <a:p>
+            <a:pPr indent="0" lvl="0" marL="0" marR="0" rtl="0" algn="just">
+              <a:lnSpc>
+                <a:spcPct val="120000"/>
+              </a:lnSpc>
+              <a:spcBef>
+                <a:spcPts val="0"/>
+              </a:spcBef>
+              <a:spcAft>
+                <a:spcPts val="0"/>
+              </a:spcAft>
+              <a:buNone/>
+            </a:pPr>
+            <a:r>
+              <a:rPr b="0" i="0" lang="en-US" sz="2000" u="none" cap="none" strike="noStrike">
+                <a:solidFill>
+                  <a:srgbClr val="307FE2"/>
+                </a:solidFill>
+                <a:latin typeface="Montserrat"/>
+                <a:ea typeface="Montserrat"/>
+                <a:cs typeface="Montserrat"/>
+                <a:sym typeface="Montserrat"/>
+              </a:rPr>
+              <a:t>La evaluación asistida por IA ha demostrado ser una solución eficaz para los desafíos actuales en la corrección de evaluaciones. Este enfoque no solo mejora la precisión y diversidad en la calificación, sino que también permite a los docentes mantener el control sobre el proceso educativo mientras se benefician de la asistencia tecnológica.</a:t>
+            </a:r>
+            <a:endParaRPr/>
+          </a:p>
+        </p:txBody>
+      </p:sp>
+    </p:spTree>
+  </p:cSld>
+  <p:clrMapOvr>
+    <a:masterClrMapping/>
+  </p:clrMapOvr>
+</p:sld>
+</file>
+
+<file path=ppt/slides/slide21.xml><?xml version="1.0" encoding="utf-8"?>
+<p:sld xmlns:a="http://schemas.openxmlformats.org/drawingml/2006/main" xmlns:r="http://schemas.openxmlformats.org/officeDocument/2006/relationships" xmlns:mc="http://schemas.openxmlformats.org/markup-compatibility/2006" xmlns:mv="urn:schemas-microsoft-com:mac:vml" xmlns:p="http://schemas.openxmlformats.org/presentationml/2006/main" xmlns:c="http://schemas.openxmlformats.org/drawingml/2006/chart" xmlns:dgm="http://schemas.openxmlformats.org/drawingml/2006/diagram" xmlns:o="urn:schemas-microsoft-com:office:office" xmlns:v="urn:schemas-microsoft-com:vml" xmlns:pvml="urn:schemas-microsoft-com:office:powerpoint" xmlns:com="http://schemas.openxmlformats.org/drawingml/2006/compatibility" xmlns:p14="http://schemas.microsoft.com/office/powerpoint/2010/main" xmlns:p15="http://schemas.microsoft.com/office/powerpoint/2012/main" xmlns:ahyp="http://schemas.microsoft.com/office/drawing/2018/hyperlinkcolor">
+  <p:cSld>
+    <p:bg>
+      <p:bgPr>
+        <a:solidFill>
+          <a:srgbClr val="F3F4F6"/>
+        </a:solidFill>
+      </p:bgPr>
+    </p:bg>
+    <p:spTree>
+      <p:nvGrpSpPr>
+        <p:cNvPr id="266" name="Shape 266"/>
+        <p:cNvGrpSpPr/>
+        <p:nvPr/>
+      </p:nvGrpSpPr>
+      <p:grpSpPr>
+        <a:xfrm>
+          <a:off x="0" y="0"/>
+          <a:ext cx="0" cy="0"/>
+          <a:chOff x="0" y="0"/>
+          <a:chExt cx="0" cy="0"/>
+        </a:xfrm>
+      </p:grpSpPr>
+      <p:sp>
+        <p:nvSpPr>
+          <p:cNvPr id="267" name="Google Shape;267;p19"/>
+          <p:cNvSpPr txBox="1"/>
+          <p:nvPr/>
+        </p:nvSpPr>
+        <p:spPr>
+          <a:xfrm>
+            <a:off x="3430246" y="3669664"/>
+            <a:ext cx="11427508" cy="2995297"/>
+          </a:xfrm>
+          <a:prstGeom prst="rect">
+            <a:avLst/>
+          </a:prstGeom>
+          <a:noFill/>
+          <a:ln>
+            <a:noFill/>
+          </a:ln>
+        </p:spPr>
+        <p:txBody>
+          <a:bodyPr anchorCtr="0" anchor="t" bIns="0" lIns="0" spcFirstLastPara="1" rIns="0" wrap="square" tIns="0">
+            <a:spAutoFit/>
+          </a:bodyPr>
+          <a:lstStyle/>
+          <a:p>
+            <a:pPr indent="0" lvl="0" marL="0" marR="0" rtl="0" algn="l">
+              <a:lnSpc>
+                <a:spcPct val="112000"/>
+              </a:lnSpc>
+              <a:spcBef>
+                <a:spcPts val="0"/>
+              </a:spcBef>
+              <a:spcAft>
+                <a:spcPts val="0"/>
+              </a:spcAft>
+              <a:buNone/>
+            </a:pPr>
+            <a:r>
+              <a:rPr b="1" i="0" lang="en-US" sz="7000" u="none" cap="none" strike="noStrike">
+                <a:solidFill>
+                  <a:srgbClr val="0A6ED8"/>
+                </a:solidFill>
+                <a:latin typeface="Montserrat"/>
+                <a:ea typeface="Montserrat"/>
+                <a:cs typeface="Montserrat"/>
+                <a:sym typeface="Montserrat"/>
+              </a:rPr>
+              <a:t>PREGUNTAS DE LA COMISIÓN</a:t>
+            </a:r>
+            <a:endParaRPr/>
+          </a:p>
+          <a:p>
+            <a:pPr indent="0" lvl="0" marL="0" marR="0" rtl="0" algn="l">
+              <a:lnSpc>
+                <a:spcPct val="112000"/>
+              </a:lnSpc>
+              <a:spcBef>
+                <a:spcPts val="0"/>
+              </a:spcBef>
+              <a:spcAft>
+                <a:spcPts val="0"/>
+              </a:spcAft>
+              <a:buNone/>
+            </a:pPr>
+            <a:r>
+              <a:t/>
+            </a:r>
+            <a:endParaRPr b="1" i="0" sz="7000" u="none" cap="none" strike="noStrike">
+              <a:solidFill>
+                <a:srgbClr val="0A6ED8"/>
+              </a:solidFill>
+              <a:latin typeface="Montserrat"/>
+              <a:ea typeface="Montserrat"/>
+              <a:cs typeface="Montserrat"/>
+              <a:sym typeface="Montserrat"/>
+            </a:endParaRPr>
+          </a:p>
+        </p:txBody>
+      </p:sp>
+    </p:spTree>
+  </p:cSld>
+  <p:clrMapOvr>
+    <a:masterClrMapping/>
+  </p:clrMapOvr>
+</p:sld>
+</file>
+
 <file path=ppt/slides/slide3.xml><?xml version="1.0" encoding="utf-8"?>
 <p:sld xmlns:a="http://schemas.openxmlformats.org/drawingml/2006/main" xmlns:r="http://schemas.openxmlformats.org/officeDocument/2006/relationships" xmlns:mc="http://schemas.openxmlformats.org/markup-compatibility/2006" xmlns:mv="urn:schemas-microsoft-com:mac:vml" xmlns:p="http://schemas.openxmlformats.org/presentationml/2006/main" xmlns:c="http://schemas.openxmlformats.org/drawingml/2006/chart" xmlns:dgm="http://schemas.openxmlformats.org/drawingml/2006/diagram" xmlns:o="urn:schemas-microsoft-com:office:office" xmlns:v="urn:schemas-microsoft-com:vml" xmlns:pvml="urn:schemas-microsoft-com:office:powerpoint" xmlns:com="http://schemas.openxmlformats.org/drawingml/2006/compatibility" xmlns:p14="http://schemas.microsoft.com/office/powerpoint/2010/main" xmlns:p15="http://schemas.microsoft.com/office/powerpoint/2012/main" xmlns:ahyp="http://schemas.microsoft.com/office/drawing/2018/hyperlinkcolor">
   <p:cSld>
@@ -23483,7 +23936,7 @@
         <p:spPr>
           <a:xfrm>
             <a:off x="1157612" y="2997599"/>
-            <a:ext cx="8811362" cy="1219200"/>
+            <a:ext cx="8811300" cy="1416000"/>
           </a:xfrm>
           <a:prstGeom prst="rect">
             <a:avLst/>
@@ -23521,7 +23974,55 @@
                 <a:cs typeface="Montserrat"/>
                 <a:sym typeface="Montserrat"/>
               </a:rPr>
-              <a:t>Actualmente, Duoc UC no cuenta con un sistema especializado para apoyar la corrección de evaluaciones. El proceso depende totalmente del trabajo manual del docente, lo que hace que la revisión sea lenta, pesada y difícil de estandarizar.</a:t>
+              <a:t>Actualmente, </a:t>
+            </a:r>
+            <a:r>
+              <a:rPr lang="en-US" sz="2000">
+                <a:solidFill>
+                  <a:srgbClr val="307FE2"/>
+                </a:solidFill>
+                <a:latin typeface="Montserrat"/>
+                <a:ea typeface="Montserrat"/>
+                <a:cs typeface="Montserrat"/>
+                <a:sym typeface="Montserrat"/>
+              </a:rPr>
+              <a:t>no existe </a:t>
+            </a:r>
+            <a:r>
+              <a:rPr b="0" i="0" lang="en-US" sz="2000" u="none" cap="none" strike="noStrike">
+                <a:solidFill>
+                  <a:srgbClr val="307FE2"/>
+                </a:solidFill>
+                <a:latin typeface="Montserrat"/>
+                <a:ea typeface="Montserrat"/>
+                <a:cs typeface="Montserrat"/>
+                <a:sym typeface="Montserrat"/>
+              </a:rPr>
+              <a:t>un sistema especializado para apoyar la corrección de evaluaciones. El proceso depende totalmente del trabajo manual del docente, lo que hace que la revisión sea lenta, pesada y </a:t>
+            </a:r>
+            <a:r>
+              <a:rPr lang="en-US" sz="2000">
+                <a:solidFill>
+                  <a:srgbClr val="307FE2"/>
+                </a:solidFill>
+                <a:latin typeface="Montserrat"/>
+                <a:ea typeface="Montserrat"/>
+                <a:cs typeface="Montserrat"/>
+                <a:sym typeface="Montserrat"/>
+              </a:rPr>
+              <a:t>sin sesgos</a:t>
+            </a:r>
+            <a:r>
+              <a:rPr b="0" i="0" lang="en-US" sz="2000" u="none" cap="none" strike="noStrike">
+                <a:solidFill>
+                  <a:srgbClr val="307FE2"/>
+                </a:solidFill>
+                <a:latin typeface="Montserrat"/>
+                <a:ea typeface="Montserrat"/>
+                <a:cs typeface="Montserrat"/>
+                <a:sym typeface="Montserrat"/>
+              </a:rPr>
+              <a:t>.</a:t>
             </a:r>
             <a:endParaRPr/>
           </a:p>
@@ -24024,7 +24525,7 @@
         <p:spPr>
           <a:xfrm>
             <a:off x="1157612" y="2997599"/>
-            <a:ext cx="8811362" cy="3657600"/>
+            <a:ext cx="8811300" cy="4371300"/>
           </a:xfrm>
           <a:prstGeom prst="rect">
             <a:avLst/>
@@ -24062,7 +24563,7 @@
                 <a:cs typeface="Montserrat"/>
                 <a:sym typeface="Montserrat"/>
               </a:rPr>
-              <a:t>Desarrollar Krino Insight, una plataforma web que integra inteligencia artificial para automatizar y optimizar el proceso de corrección académica. El sistema permite cargar evaluaciones y rúbricas, aplicar automáticamente los criterios definidos mediante un agente de IA, y generar puntajes preliminares junto con retroalimentación detallada.</a:t>
+              <a:t>Krino Insight, una plataforma web que integra inteligencia artificial para automatizar y optimizar el proceso de corrección académica. El sistema permite cargar evaluaciones y rúbricas, aplicar automáticamente los criterios definidos mediante un sistema multi-agentes de IA, y generar puntajes preliminares junto con retroalimentación detallada.</a:t>
             </a:r>
             <a:endParaRPr/>
           </a:p>
@@ -24288,7 +24789,7 @@
         <p:spPr>
           <a:xfrm>
             <a:off x="1157612" y="2997599"/>
-            <a:ext cx="8811362" cy="2133600"/>
+            <a:ext cx="8811300" cy="2524500"/>
           </a:xfrm>
           <a:prstGeom prst="rect">
             <a:avLst/>
@@ -24326,7 +24827,31 @@
                 <a:cs typeface="Montserrat"/>
                 <a:sym typeface="Montserrat"/>
               </a:rPr>
-              <a:t>Desarrollar una plataforma web denominada Krino Insight que permita la gestión y corrección automatizada de evaluaciones en Duoc UC, integrando inteligencia artificial para asistir en la asignación preliminar de puntajes y la generación de retroalimentación, asegurando un proceso más eficiente, consistente y escalable para los docentes, en línea con los criterios definidos en rúbricas académicas.</a:t>
+              <a:t>Desarrollar Krino Insight, </a:t>
+            </a:r>
+            <a:r>
+              <a:rPr lang="en-US" sz="2000">
+                <a:solidFill>
+                  <a:srgbClr val="307FE2"/>
+                </a:solidFill>
+                <a:latin typeface="Montserrat"/>
+                <a:ea typeface="Montserrat"/>
+                <a:cs typeface="Montserrat"/>
+                <a:sym typeface="Montserrat"/>
+              </a:rPr>
+              <a:t>una plataforma web </a:t>
+            </a:r>
+            <a:r>
+              <a:rPr b="0" i="0" lang="en-US" sz="2000" u="none" cap="none" strike="noStrike">
+                <a:solidFill>
+                  <a:srgbClr val="307FE2"/>
+                </a:solidFill>
+                <a:latin typeface="Montserrat"/>
+                <a:ea typeface="Montserrat"/>
+                <a:cs typeface="Montserrat"/>
+                <a:sym typeface="Montserrat"/>
+              </a:rPr>
+              <a:t>que permita la gestión y corrección automatizada de evaluaciones en Duoc UC, integrando agentes con inteligencia artificial para asistir en la asignación preliminar de puntajes y la generación de retroalimentación, asegurando un proceso más eficiente, consistente y escalable para los docentes, en línea con los criterios definidos en rúbricas académicas.</a:t>
             </a:r>
             <a:endParaRPr/>
           </a:p>
@@ -24499,7 +25024,7 @@
         <p:spPr>
           <a:xfrm>
             <a:off x="1157612" y="2997599"/>
-            <a:ext cx="8811362" cy="4572000"/>
+            <a:ext cx="8811300" cy="5479800"/>
           </a:xfrm>
           <a:prstGeom prst="rect">
             <a:avLst/>
@@ -24542,7 +25067,31 @@
                 <a:cs typeface="Montserrat"/>
                 <a:sym typeface="Montserrat"/>
               </a:rPr>
-              <a:t>Implementar una base web segura y escalable para gestionar usuarios y roles.</a:t>
+              <a:t>Implementar una </a:t>
+            </a:r>
+            <a:r>
+              <a:rPr lang="en-US" sz="2000">
+                <a:solidFill>
+                  <a:srgbClr val="307FE2"/>
+                </a:solidFill>
+                <a:latin typeface="Montserrat"/>
+                <a:ea typeface="Montserrat"/>
+                <a:cs typeface="Montserrat"/>
+                <a:sym typeface="Montserrat"/>
+              </a:rPr>
+              <a:t>sistema </a:t>
+            </a:r>
+            <a:r>
+              <a:rPr b="0" i="0" lang="en-US" sz="2000" u="none" cap="none" strike="noStrike">
+                <a:solidFill>
+                  <a:srgbClr val="307FE2"/>
+                </a:solidFill>
+                <a:latin typeface="Montserrat"/>
+                <a:ea typeface="Montserrat"/>
+                <a:cs typeface="Montserrat"/>
+                <a:sym typeface="Montserrat"/>
+              </a:rPr>
+              <a:t>web segura y escalable para gestionar usuarios y roles.</a:t>
             </a:r>
             <a:endParaRPr/>
           </a:p>
@@ -24894,7 +25443,7 @@
         <p:spPr>
           <a:xfrm>
             <a:off x="1157612" y="2997599"/>
-            <a:ext cx="8811362" cy="5791200"/>
+            <a:ext cx="8811300" cy="5849100"/>
           </a:xfrm>
           <a:prstGeom prst="rect">
             <a:avLst/>
@@ -24937,9 +25486,49 @@
                 <a:cs typeface="Montserrat"/>
                 <a:sym typeface="Montserrat"/>
               </a:rPr>
-              <a:t>Se cumplió el objetivo de implementar la corrección asistida por IA (API de OpenAI). El sistema está operativo para esta tarea.</a:t>
+              <a:t>Se </a:t>
             </a:r>
-            <a:endParaRPr/>
+            <a:r>
+              <a:rPr lang="en-US" sz="2000">
+                <a:solidFill>
+                  <a:srgbClr val="307FE2"/>
+                </a:solidFill>
+                <a:latin typeface="Montserrat"/>
+                <a:ea typeface="Montserrat"/>
+                <a:cs typeface="Montserrat"/>
+                <a:sym typeface="Montserrat"/>
+              </a:rPr>
+              <a:t>implementa</a:t>
+            </a:r>
+            <a:r>
+              <a:rPr b="0" i="0" lang="en-US" sz="2000" u="none" cap="none" strike="noStrike">
+                <a:solidFill>
+                  <a:srgbClr val="307FE2"/>
+                </a:solidFill>
+                <a:latin typeface="Montserrat"/>
+                <a:ea typeface="Montserrat"/>
+                <a:cs typeface="Montserrat"/>
+                <a:sym typeface="Montserrat"/>
+              </a:rPr>
+              <a:t> la corrección asistida por IA (API de OpenAI). </a:t>
+            </a:r>
+            <a:r>
+              <a:rPr lang="en-US" sz="2000">
+                <a:solidFill>
+                  <a:srgbClr val="307FE2"/>
+                </a:solidFill>
+                <a:latin typeface="Montserrat"/>
+                <a:ea typeface="Montserrat"/>
+                <a:cs typeface="Montserrat"/>
+                <a:sym typeface="Montserrat"/>
+              </a:rPr>
+              <a:t>Los docentes pueden ver sus secciones, la lista de estudiantes, las evaluaciones y las notas obtenidas correspondientes.</a:t>
+            </a:r>
+            <a:endParaRPr>
+              <a:solidFill>
+                <a:schemeClr val="dk1"/>
+              </a:solidFill>
+            </a:endParaRPr>
           </a:p>
           <a:p>
             <a:pPr indent="0" lvl="0" marL="0" marR="0" rtl="0" algn="just">
@@ -24995,9 +25584,41 @@
                 <a:cs typeface="Montserrat"/>
                 <a:sym typeface="Montserrat"/>
               </a:rPr>
-              <a:t>El sistema fue validado y logra evaluar correctamente las asignaturas de "Desarrollo Orientado a Objetos" y "Fundamentos de Programación".</a:t>
+              <a:t>El sistema </a:t>
             </a:r>
-            <a:endParaRPr/>
+            <a:r>
+              <a:rPr lang="en-US" sz="2000">
+                <a:solidFill>
+                  <a:srgbClr val="307FE2"/>
+                </a:solidFill>
+                <a:latin typeface="Montserrat"/>
+                <a:ea typeface="Montserrat"/>
+                <a:cs typeface="Montserrat"/>
+                <a:sym typeface="Montserrat"/>
+              </a:rPr>
+              <a:t>evalúa</a:t>
+            </a:r>
+            <a:r>
+              <a:rPr b="0" i="0" lang="en-US" sz="2000" u="none" cap="none" strike="noStrike">
+                <a:solidFill>
+                  <a:srgbClr val="307FE2"/>
+                </a:solidFill>
+                <a:latin typeface="Montserrat"/>
+                <a:ea typeface="Montserrat"/>
+                <a:cs typeface="Montserrat"/>
+                <a:sym typeface="Montserrat"/>
+              </a:rPr>
+              <a:t> de manera correcta las asignaturas de "Desarrollo Orientado a Objetos" y "Fundamentos de Programación".</a:t>
+            </a:r>
+            <a:endParaRPr b="0" i="0" sz="2000" u="none" cap="none" strike="noStrike">
+              <a:solidFill>
+                <a:srgbClr val="307FE2"/>
+              </a:solidFill>
+              <a:latin typeface="Montserrat"/>
+              <a:ea typeface="Montserrat"/>
+              <a:cs typeface="Montserrat"/>
+              <a:sym typeface="Montserrat"/>
+            </a:endParaRPr>
           </a:p>
           <a:p>
             <a:pPr indent="0" lvl="0" marL="0" marR="0" rtl="0" algn="just">
@@ -25053,54 +25674,20 @@
                 <a:cs typeface="Montserrat"/>
                 <a:sym typeface="Montserrat"/>
               </a:rPr>
-              <a:t>Los docentes pueden ver sus secciones, la lista de estudiantes, las evaluaciones y las notas obtenidas correspondientes.</a:t>
+              <a:t>El agente inteligente evalúa </a:t>
             </a:r>
-            <a:endParaRPr/>
-          </a:p>
-          <a:p>
-            <a:pPr indent="0" lvl="0" marL="0" marR="0" rtl="0" algn="just">
-              <a:lnSpc>
-                <a:spcPct val="120000"/>
-              </a:lnSpc>
-              <a:spcBef>
-                <a:spcPts val="0"/>
-              </a:spcBef>
-              <a:spcAft>
-                <a:spcPts val="0"/>
-              </a:spcAft>
-              <a:buNone/>
-            </a:pPr>
             <a:r>
-              <a:t/>
+              <a:rPr lang="en-US" sz="2000">
+                <a:solidFill>
+                  <a:srgbClr val="307FE2"/>
+                </a:solidFill>
+                <a:latin typeface="Montserrat"/>
+                <a:ea typeface="Montserrat"/>
+                <a:cs typeface="Montserrat"/>
+                <a:sym typeface="Montserrat"/>
+              </a:rPr>
+              <a:t>correctamente</a:t>
             </a:r>
-            <a:endParaRPr b="0" i="0" sz="2000" u="none" cap="none" strike="noStrike">
-              <a:solidFill>
-                <a:srgbClr val="307FE2"/>
-              </a:solidFill>
-              <a:latin typeface="Montserrat"/>
-              <a:ea typeface="Montserrat"/>
-              <a:cs typeface="Montserrat"/>
-              <a:sym typeface="Montserrat"/>
-            </a:endParaRPr>
-          </a:p>
-          <a:p>
-            <a:pPr indent="-215900" lvl="1" marL="431801" marR="0" rtl="0" algn="just">
-              <a:lnSpc>
-                <a:spcPct val="120000"/>
-              </a:lnSpc>
-              <a:spcBef>
-                <a:spcPts val="0"/>
-              </a:spcBef>
-              <a:spcAft>
-                <a:spcPts val="0"/>
-              </a:spcAft>
-              <a:buClr>
-                <a:srgbClr val="307FE2"/>
-              </a:buClr>
-              <a:buSzPts val="2000"/>
-              <a:buFont typeface="Arial"/>
-              <a:buChar char="•"/>
-            </a:pPr>
             <a:r>
               <a:rPr b="0" i="0" lang="en-US" sz="2000" u="none" cap="none" strike="noStrike">
                 <a:solidFill>
@@ -25111,7 +25698,7 @@
                 <a:cs typeface="Montserrat"/>
                 <a:sym typeface="Montserrat"/>
               </a:rPr>
-              <a:t>El agente inteligente evalúa mucho mejor que al inicio, mostrando una mayor diversidad en las notas entregadas. Esto se logró adaptando las rúbricas (con más puntaje) y dando más "libertad" al modelo.</a:t>
+              <a:t>, mostrando una mayor diversidad en las notas entregadas. Esto se logró adaptando las rúbricas (con más puntaje) y dando más "libertad" al modelo.</a:t>
             </a:r>
             <a:endParaRPr/>
           </a:p>
@@ -25447,7 +26034,7 @@
         <p:spPr>
           <a:xfrm>
             <a:off x="1157612" y="2997599"/>
-            <a:ext cx="8811362" cy="3352800"/>
+            <a:ext cx="8811300" cy="4371300"/>
           </a:xfrm>
           <a:prstGeom prst="rect">
             <a:avLst/>
@@ -25606,7 +26193,43 @@
                 <a:cs typeface="Montserrat"/>
                 <a:sym typeface="Montserrat"/>
               </a:rPr>
-              <a:t>Limitación de uso del Microsoft Azure, ya que estamos destinados a solamente las herramientas que nos proporciona.</a:t>
+              <a:t>Limitación de uso del Microsoft Azure, ya que estamos destinados a solamente las herramientas que nos proporciona. No </a:t>
+            </a:r>
+            <a:r>
+              <a:rPr lang="en-US" sz="2000">
+                <a:solidFill>
+                  <a:srgbClr val="307FE2"/>
+                </a:solidFill>
+                <a:latin typeface="Montserrat"/>
+                <a:ea typeface="Montserrat"/>
+                <a:cs typeface="Montserrat"/>
+                <a:sym typeface="Montserrat"/>
+              </a:rPr>
+              <a:t>está</a:t>
+            </a:r>
+            <a:r>
+              <a:rPr b="0" i="0" lang="en-US" sz="2000" u="none" cap="none" strike="noStrike">
+                <a:solidFill>
+                  <a:srgbClr val="307FE2"/>
+                </a:solidFill>
+                <a:latin typeface="Montserrat"/>
+                <a:ea typeface="Montserrat"/>
+                <a:cs typeface="Montserrat"/>
+                <a:sym typeface="Montserrat"/>
+              </a:rPr>
+              <a:t> bien </a:t>
+            </a:r>
+            <a:r>
+              <a:rPr lang="en-US" sz="2000">
+                <a:solidFill>
+                  <a:srgbClr val="307FE2"/>
+                </a:solidFill>
+                <a:latin typeface="Montserrat"/>
+                <a:ea typeface="Montserrat"/>
+                <a:cs typeface="Montserrat"/>
+                <a:sym typeface="Montserrat"/>
+              </a:rPr>
+              <a:t>implementado para el uso de agentes con Inteligencia artificial.</a:t>
             </a:r>
             <a:endParaRPr/>
           </a:p>
@@ -25647,6 +26270,285 @@
 </file>
 
 <file path=ppt/theme/theme1.xml><?xml version="1.0" encoding="utf-8"?>
+<a:theme xmlns:a="http://schemas.openxmlformats.org/drawingml/2006/main" xmlns:r="http://schemas.openxmlformats.org/officeDocument/2006/relationships" name="Office Theme">
+  <a:themeElements>
+    <a:clrScheme name="Office">
+      <a:dk1>
+        <a:srgbClr val="000000"/>
+      </a:dk1>
+      <a:lt1>
+        <a:srgbClr val="FFFFFF"/>
+      </a:lt1>
+      <a:dk2>
+        <a:srgbClr val="1F497D"/>
+      </a:dk2>
+      <a:lt2>
+        <a:srgbClr val="EEECE1"/>
+      </a:lt2>
+      <a:accent1>
+        <a:srgbClr val="4F81BD"/>
+      </a:accent1>
+      <a:accent2>
+        <a:srgbClr val="C0504D"/>
+      </a:accent2>
+      <a:accent3>
+        <a:srgbClr val="9BBB59"/>
+      </a:accent3>
+      <a:accent4>
+        <a:srgbClr val="8064A2"/>
+      </a:accent4>
+      <a:accent5>
+        <a:srgbClr val="4BACC6"/>
+      </a:accent5>
+      <a:accent6>
+        <a:srgbClr val="F79646"/>
+      </a:accent6>
+      <a:hlink>
+        <a:srgbClr val="0000FF"/>
+      </a:hlink>
+      <a:folHlink>
+        <a:srgbClr val="800080"/>
+      </a:folHlink>
+    </a:clrScheme>
+    <a:fontScheme name="Office">
+      <a:majorFont>
+        <a:latin typeface="Arial"/>
+        <a:ea typeface=""/>
+        <a:cs typeface=""/>
+        <a:font script="Jpan" typeface="ＭＳ Ｐゴシック"/>
+        <a:font script="Hang" typeface="맑은 고딕"/>
+        <a:font script="Hans" typeface="宋体"/>
+        <a:font script="Hant" typeface="新細明體"/>
+        <a:font script="Arab" typeface="Times New Roman"/>
+        <a:font script="Hebr" typeface="Times New Roman"/>
+        <a:font script="Thai" typeface="Angsana New"/>
+        <a:font script="Ethi" typeface="Nyala"/>
+        <a:font script="Beng" typeface="Vrinda"/>
+        <a:font script="Gujr" typeface="Shruti"/>
+        <a:font script="Khmr" typeface="MoolBoran"/>
+        <a:font script="Knda" typeface="Tunga"/>
+        <a:font script="Guru" typeface="Raavi"/>
+        <a:font script="Cans" typeface="Euphemia"/>
+        <a:font script="Cher" typeface="Plantagenet Cherokee"/>
+        <a:font script="Yiii" typeface="Microsoft Yi Baiti"/>
+        <a:font script="Tibt" typeface="Microsoft Himalaya"/>
+        <a:font script="Thaa" typeface="MV Boli"/>
+        <a:font script="Deva" typeface="Mangal"/>
+        <a:font script="Telu" typeface="Gautami"/>
+        <a:font script="Taml" typeface="Latha"/>
+        <a:font script="Syrc" typeface="Estrangelo Edessa"/>
+        <a:font script="Orya" typeface="Kalinga"/>
+        <a:font script="Mlym" typeface="Kartika"/>
+        <a:font script="Laoo" typeface="DokChampa"/>
+        <a:font script="Sinh" typeface="Iskoola Pota"/>
+        <a:font script="Mong" typeface="Mongolian Baiti"/>
+        <a:font script="Viet" typeface="Times New Roman"/>
+        <a:font script="Uigh" typeface="Microsoft Uighur"/>
+        <a:font script="Geor" typeface="Sylfaen"/>
+      </a:majorFont>
+      <a:minorFont>
+        <a:latin typeface="Arial"/>
+        <a:ea typeface=""/>
+        <a:cs typeface=""/>
+        <a:font script="Jpan" typeface="ＭＳ Ｐゴシック"/>
+        <a:font script="Hang" typeface="맑은 고딕"/>
+        <a:font script="Hans" typeface="宋体"/>
+        <a:font script="Hant" typeface="新細明體"/>
+        <a:font script="Arab" typeface="Arial"/>
+        <a:font script="Hebr" typeface="Arial"/>
+        <a:font script="Thai" typeface="Cordia New"/>
+        <a:font script="Ethi" typeface="Nyala"/>
+        <a:font script="Beng" typeface="Vrinda"/>
+        <a:font script="Gujr" typeface="Shruti"/>
+        <a:font script="Khmr" typeface="DaunPenh"/>
+        <a:font script="Knda" typeface="Tunga"/>
+        <a:font script="Guru" typeface="Raavi"/>
+        <a:font script="Cans" typeface="Euphemia"/>
+        <a:font script="Cher" typeface="Plantagenet Cherokee"/>
+        <a:font script="Yiii" typeface="Microsoft Yi Baiti"/>
+        <a:font script="Tibt" typeface="Microsoft Himalaya"/>
+        <a:font script="Thaa" typeface="MV Boli"/>
+        <a:font script="Deva" typeface="Mangal"/>
+        <a:font script="Telu" typeface="Gautami"/>
+        <a:font script="Taml" typeface="Latha"/>
+        <a:font script="Syrc" typeface="Estrangelo Edessa"/>
+        <a:font script="Orya" typeface="Kalinga"/>
+        <a:font script="Mlym" typeface="Kartika"/>
+        <a:font script="Laoo" typeface="DokChampa"/>
+        <a:font script="Sinh" typeface="Iskoola Pota"/>
+        <a:font script="Mong" typeface="Mongolian Baiti"/>
+        <a:font script="Viet" typeface="Arial"/>
+        <a:font script="Uigh" typeface="Microsoft Uighur"/>
+        <a:font script="Geor" typeface="Sylfaen"/>
+      </a:minorFont>
+    </a:fontScheme>
+    <a:fmtScheme name="Office">
+      <a:fillStyleLst>
+        <a:solidFill>
+          <a:schemeClr val="phClr"/>
+        </a:solidFill>
+        <a:gradFill rotWithShape="1">
+          <a:gsLst>
+            <a:gs pos="0">
+              <a:schemeClr val="phClr">
+                <a:tint val="50000"/>
+                <a:satMod val="300000"/>
+              </a:schemeClr>
+            </a:gs>
+            <a:gs pos="35000">
+              <a:schemeClr val="phClr">
+                <a:tint val="37000"/>
+                <a:satMod val="300000"/>
+              </a:schemeClr>
+            </a:gs>
+            <a:gs pos="100000">
+              <a:schemeClr val="phClr">
+                <a:tint val="15000"/>
+                <a:satMod val="350000"/>
+              </a:schemeClr>
+            </a:gs>
+          </a:gsLst>
+          <a:lin ang="16200000" scaled="1"/>
+        </a:gradFill>
+        <a:gradFill rotWithShape="1">
+          <a:gsLst>
+            <a:gs pos="0">
+              <a:schemeClr val="phClr">
+                <a:tint val="100000"/>
+                <a:shade val="100000"/>
+                <a:satMod val="130000"/>
+              </a:schemeClr>
+            </a:gs>
+            <a:gs pos="100000">
+              <a:schemeClr val="phClr">
+                <a:tint val="50000"/>
+                <a:shade val="100000"/>
+                <a:satMod val="350000"/>
+              </a:schemeClr>
+            </a:gs>
+          </a:gsLst>
+          <a:lin ang="16200000" scaled="0"/>
+        </a:gradFill>
+      </a:fillStyleLst>
+      <a:lnStyleLst>
+        <a:ln w="9525" cap="flat" cmpd="sng" algn="ctr">
+          <a:solidFill>
+            <a:schemeClr val="phClr">
+              <a:shade val="95000"/>
+              <a:satMod val="105000"/>
+            </a:schemeClr>
+          </a:solidFill>
+          <a:prstDash val="solid"/>
+        </a:ln>
+        <a:ln w="25400" cap="flat" cmpd="sng" algn="ctr">
+          <a:solidFill>
+            <a:schemeClr val="phClr"/>
+          </a:solidFill>
+          <a:prstDash val="solid"/>
+        </a:ln>
+        <a:ln w="38100" cap="flat" cmpd="sng" algn="ctr">
+          <a:solidFill>
+            <a:schemeClr val="phClr"/>
+          </a:solidFill>
+          <a:prstDash val="solid"/>
+        </a:ln>
+      </a:lnStyleLst>
+      <a:effectStyleLst>
+        <a:effectStyle>
+          <a:effectLst>
+            <a:outerShdw blurRad="40000" dist="20000" dir="5400000" rotWithShape="0">
+              <a:srgbClr val="000000">
+                <a:alpha val="38000"/>
+              </a:srgbClr>
+            </a:outerShdw>
+          </a:effectLst>
+        </a:effectStyle>
+        <a:effectStyle>
+          <a:effectLst>
+            <a:outerShdw blurRad="40000" dist="23000" dir="5400000" rotWithShape="0">
+              <a:srgbClr val="000000">
+                <a:alpha val="35000"/>
+              </a:srgbClr>
+            </a:outerShdw>
+          </a:effectLst>
+        </a:effectStyle>
+        <a:effectStyle>
+          <a:effectLst>
+            <a:outerShdw blurRad="40000" dist="23000" dir="5400000" rotWithShape="0">
+              <a:srgbClr val="000000">
+                <a:alpha val="35000"/>
+              </a:srgbClr>
+            </a:outerShdw>
+          </a:effectLst>
+          <a:scene3d>
+            <a:camera prst="orthographicFront">
+              <a:rot lat="0" lon="0" rev="0"/>
+            </a:camera>
+            <a:lightRig rig="threePt" dir="t">
+              <a:rot lat="0" lon="0" rev="1200000"/>
+            </a:lightRig>
+          </a:scene3d>
+          <a:sp3d>
+            <a:bevelT w="63500" h="25400"/>
+          </a:sp3d>
+        </a:effectStyle>
+      </a:effectStyleLst>
+      <a:bgFillStyleLst>
+        <a:solidFill>
+          <a:schemeClr val="phClr"/>
+        </a:solidFill>
+        <a:gradFill rotWithShape="1">
+          <a:gsLst>
+            <a:gs pos="0">
+              <a:schemeClr val="phClr">
+                <a:tint val="40000"/>
+                <a:satMod val="350000"/>
+              </a:schemeClr>
+            </a:gs>
+            <a:gs pos="40000">
+              <a:schemeClr val="phClr">
+                <a:tint val="45000"/>
+                <a:shade val="99000"/>
+                <a:satMod val="350000"/>
+              </a:schemeClr>
+            </a:gs>
+            <a:gs pos="100000">
+              <a:schemeClr val="phClr">
+                <a:shade val="20000"/>
+                <a:satMod val="255000"/>
+              </a:schemeClr>
+            </a:gs>
+          </a:gsLst>
+          <a:path path="circle">
+            <a:fillToRect l="50000" t="-80000" r="50000" b="180000"/>
+          </a:path>
+        </a:gradFill>
+        <a:gradFill rotWithShape="1">
+          <a:gsLst>
+            <a:gs pos="0">
+              <a:schemeClr val="phClr">
+                <a:tint val="80000"/>
+                <a:satMod val="300000"/>
+              </a:schemeClr>
+            </a:gs>
+            <a:gs pos="100000">
+              <a:schemeClr val="phClr">
+                <a:shade val="30000"/>
+                <a:satMod val="200000"/>
+              </a:schemeClr>
+            </a:gs>
+          </a:gsLst>
+          <a:path path="circle">
+            <a:fillToRect l="50000" t="50000" r="50000" b="50000"/>
+          </a:path>
+        </a:gradFill>
+      </a:bgFillStyleLst>
+    </a:fmtScheme>
+  </a:themeElements>
+</a:theme>
+</file>
+
+<file path=ppt/theme/theme2.xml><?xml version="1.0" encoding="utf-8"?>
 <a:theme xmlns:a="http://schemas.openxmlformats.org/drawingml/2006/main" xmlns:r="http://schemas.openxmlformats.org/officeDocument/2006/relationships">
   <a:themeElements>
     <a:clrScheme name="Default">
@@ -25923,283 +26825,4 @@
     </a:fmtScheme>
   </a:themeElements>
 </a:theme>
-</file>
-
-<file path=ppt/theme/theme2.xml><?xml version="1.0" encoding="utf-8"?>
-<a:theme xmlns:a="http://schemas.openxmlformats.org/drawingml/2006/main" xmlns:r="http://schemas.openxmlformats.org/officeDocument/2006/relationships" name="Office Theme">
-  <a:themeElements>
-    <a:clrScheme name="Office">
-      <a:dk1>
-        <a:srgbClr val="000000"/>
-      </a:dk1>
-      <a:lt1>
-        <a:srgbClr val="FFFFFF"/>
-      </a:lt1>
-      <a:dk2>
-        <a:srgbClr val="1F497D"/>
-      </a:dk2>
-      <a:lt2>
-        <a:srgbClr val="EEECE1"/>
-      </a:lt2>
-      <a:accent1>
-        <a:srgbClr val="4F81BD"/>
-      </a:accent1>
-      <a:accent2>
-        <a:srgbClr val="C0504D"/>
-      </a:accent2>
-      <a:accent3>
-        <a:srgbClr val="9BBB59"/>
-      </a:accent3>
-      <a:accent4>
-        <a:srgbClr val="8064A2"/>
-      </a:accent4>
-      <a:accent5>
-        <a:srgbClr val="4BACC6"/>
-      </a:accent5>
-      <a:accent6>
-        <a:srgbClr val="F79646"/>
-      </a:accent6>
-      <a:hlink>
-        <a:srgbClr val="0000FF"/>
-      </a:hlink>
-      <a:folHlink>
-        <a:srgbClr val="800080"/>
-      </a:folHlink>
-    </a:clrScheme>
-    <a:fontScheme name="Office">
-      <a:majorFont>
-        <a:latin typeface="Arial"/>
-        <a:ea typeface=""/>
-        <a:cs typeface=""/>
-        <a:font script="Jpan" typeface="ＭＳ Ｐゴシック"/>
-        <a:font script="Hang" typeface="맑은 고딕"/>
-        <a:font script="Hans" typeface="宋体"/>
-        <a:font script="Hant" typeface="新細明體"/>
-        <a:font script="Arab" typeface="Times New Roman"/>
-        <a:font script="Hebr" typeface="Times New Roman"/>
-        <a:font script="Thai" typeface="Angsana New"/>
-        <a:font script="Ethi" typeface="Nyala"/>
-        <a:font script="Beng" typeface="Vrinda"/>
-        <a:font script="Gujr" typeface="Shruti"/>
-        <a:font script="Khmr" typeface="MoolBoran"/>
-        <a:font script="Knda" typeface="Tunga"/>
-        <a:font script="Guru" typeface="Raavi"/>
-        <a:font script="Cans" typeface="Euphemia"/>
-        <a:font script="Cher" typeface="Plantagenet Cherokee"/>
-        <a:font script="Yiii" typeface="Microsoft Yi Baiti"/>
-        <a:font script="Tibt" typeface="Microsoft Himalaya"/>
-        <a:font script="Thaa" typeface="MV Boli"/>
-        <a:font script="Deva" typeface="Mangal"/>
-        <a:font script="Telu" typeface="Gautami"/>
-        <a:font script="Taml" typeface="Latha"/>
-        <a:font script="Syrc" typeface="Estrangelo Edessa"/>
-        <a:font script="Orya" typeface="Kalinga"/>
-        <a:font script="Mlym" typeface="Kartika"/>
-        <a:font script="Laoo" typeface="DokChampa"/>
-        <a:font script="Sinh" typeface="Iskoola Pota"/>
-        <a:font script="Mong" typeface="Mongolian Baiti"/>
-        <a:font script="Viet" typeface="Times New Roman"/>
-        <a:font script="Uigh" typeface="Microsoft Uighur"/>
-        <a:font script="Geor" typeface="Sylfaen"/>
-      </a:majorFont>
-      <a:minorFont>
-        <a:latin typeface="Arial"/>
-        <a:ea typeface=""/>
-        <a:cs typeface=""/>
-        <a:font script="Jpan" typeface="ＭＳ Ｐゴシック"/>
-        <a:font script="Hang" typeface="맑은 고딕"/>
-        <a:font script="Hans" typeface="宋体"/>
-        <a:font script="Hant" typeface="新細明體"/>
-        <a:font script="Arab" typeface="Arial"/>
-        <a:font script="Hebr" typeface="Arial"/>
-        <a:font script="Thai" typeface="Cordia New"/>
-        <a:font script="Ethi" typeface="Nyala"/>
-        <a:font script="Beng" typeface="Vrinda"/>
-        <a:font script="Gujr" typeface="Shruti"/>
-        <a:font script="Khmr" typeface="DaunPenh"/>
-        <a:font script="Knda" typeface="Tunga"/>
-        <a:font script="Guru" typeface="Raavi"/>
-        <a:font script="Cans" typeface="Euphemia"/>
-        <a:font script="Cher" typeface="Plantagenet Cherokee"/>
-        <a:font script="Yiii" typeface="Microsoft Yi Baiti"/>
-        <a:font script="Tibt" typeface="Microsoft Himalaya"/>
-        <a:font script="Thaa" typeface="MV Boli"/>
-        <a:font script="Deva" typeface="Mangal"/>
-        <a:font script="Telu" typeface="Gautami"/>
-        <a:font script="Taml" typeface="Latha"/>
-        <a:font script="Syrc" typeface="Estrangelo Edessa"/>
-        <a:font script="Orya" typeface="Kalinga"/>
-        <a:font script="Mlym" typeface="Kartika"/>
-        <a:font script="Laoo" typeface="DokChampa"/>
-        <a:font script="Sinh" typeface="Iskoola Pota"/>
-        <a:font script="Mong" typeface="Mongolian Baiti"/>
-        <a:font script="Viet" typeface="Arial"/>
-        <a:font script="Uigh" typeface="Microsoft Uighur"/>
-        <a:font script="Geor" typeface="Sylfaen"/>
-      </a:minorFont>
-    </a:fontScheme>
-    <a:fmtScheme name="Office">
-      <a:fillStyleLst>
-        <a:solidFill>
-          <a:schemeClr val="phClr"/>
-        </a:solidFill>
-        <a:gradFill rotWithShape="1">
-          <a:gsLst>
-            <a:gs pos="0">
-              <a:schemeClr val="phClr">
-                <a:tint val="50000"/>
-                <a:satMod val="300000"/>
-              </a:schemeClr>
-            </a:gs>
-            <a:gs pos="35000">
-              <a:schemeClr val="phClr">
-                <a:tint val="37000"/>
-                <a:satMod val="300000"/>
-              </a:schemeClr>
-            </a:gs>
-            <a:gs pos="100000">
-              <a:schemeClr val="phClr">
-                <a:tint val="15000"/>
-                <a:satMod val="350000"/>
-              </a:schemeClr>
-            </a:gs>
-          </a:gsLst>
-          <a:lin ang="16200000" scaled="1"/>
-        </a:gradFill>
-        <a:gradFill rotWithShape="1">
-          <a:gsLst>
-            <a:gs pos="0">
-              <a:schemeClr val="phClr">
-                <a:tint val="100000"/>
-                <a:shade val="100000"/>
-                <a:satMod val="130000"/>
-              </a:schemeClr>
-            </a:gs>
-            <a:gs pos="100000">
-              <a:schemeClr val="phClr">
-                <a:tint val="50000"/>
-                <a:shade val="100000"/>
-                <a:satMod val="350000"/>
-              </a:schemeClr>
-            </a:gs>
-          </a:gsLst>
-          <a:lin ang="16200000" scaled="0"/>
-        </a:gradFill>
-      </a:fillStyleLst>
-      <a:lnStyleLst>
-        <a:ln w="9525" cap="flat" cmpd="sng" algn="ctr">
-          <a:solidFill>
-            <a:schemeClr val="phClr">
-              <a:shade val="95000"/>
-              <a:satMod val="105000"/>
-            </a:schemeClr>
-          </a:solidFill>
-          <a:prstDash val="solid"/>
-        </a:ln>
-        <a:ln w="25400" cap="flat" cmpd="sng" algn="ctr">
-          <a:solidFill>
-            <a:schemeClr val="phClr"/>
-          </a:solidFill>
-          <a:prstDash val="solid"/>
-        </a:ln>
-        <a:ln w="38100" cap="flat" cmpd="sng" algn="ctr">
-          <a:solidFill>
-            <a:schemeClr val="phClr"/>
-          </a:solidFill>
-          <a:prstDash val="solid"/>
-        </a:ln>
-      </a:lnStyleLst>
-      <a:effectStyleLst>
-        <a:effectStyle>
-          <a:effectLst>
-            <a:outerShdw blurRad="40000" dist="20000" dir="5400000" rotWithShape="0">
-              <a:srgbClr val="000000">
-                <a:alpha val="38000"/>
-              </a:srgbClr>
-            </a:outerShdw>
-          </a:effectLst>
-        </a:effectStyle>
-        <a:effectStyle>
-          <a:effectLst>
-            <a:outerShdw blurRad="40000" dist="23000" dir="5400000" rotWithShape="0">
-              <a:srgbClr val="000000">
-                <a:alpha val="35000"/>
-              </a:srgbClr>
-            </a:outerShdw>
-          </a:effectLst>
-        </a:effectStyle>
-        <a:effectStyle>
-          <a:effectLst>
-            <a:outerShdw blurRad="40000" dist="23000" dir="5400000" rotWithShape="0">
-              <a:srgbClr val="000000">
-                <a:alpha val="35000"/>
-              </a:srgbClr>
-            </a:outerShdw>
-          </a:effectLst>
-          <a:scene3d>
-            <a:camera prst="orthographicFront">
-              <a:rot lat="0" lon="0" rev="0"/>
-            </a:camera>
-            <a:lightRig rig="threePt" dir="t">
-              <a:rot lat="0" lon="0" rev="1200000"/>
-            </a:lightRig>
-          </a:scene3d>
-          <a:sp3d>
-            <a:bevelT w="63500" h="25400"/>
-          </a:sp3d>
-        </a:effectStyle>
-      </a:effectStyleLst>
-      <a:bgFillStyleLst>
-        <a:solidFill>
-          <a:schemeClr val="phClr"/>
-        </a:solidFill>
-        <a:gradFill rotWithShape="1">
-          <a:gsLst>
-            <a:gs pos="0">
-              <a:schemeClr val="phClr">
-                <a:tint val="40000"/>
-                <a:satMod val="350000"/>
-              </a:schemeClr>
-            </a:gs>
-            <a:gs pos="40000">
-              <a:schemeClr val="phClr">
-                <a:tint val="45000"/>
-                <a:shade val="99000"/>
-                <a:satMod val="350000"/>
-              </a:schemeClr>
-            </a:gs>
-            <a:gs pos="100000">
-              <a:schemeClr val="phClr">
-                <a:shade val="20000"/>
-                <a:satMod val="255000"/>
-              </a:schemeClr>
-            </a:gs>
-          </a:gsLst>
-          <a:path path="circle">
-            <a:fillToRect l="50000" t="-80000" r="50000" b="180000"/>
-          </a:path>
-        </a:gradFill>
-        <a:gradFill rotWithShape="1">
-          <a:gsLst>
-            <a:gs pos="0">
-              <a:schemeClr val="phClr">
-                <a:tint val="80000"/>
-                <a:satMod val="300000"/>
-              </a:schemeClr>
-            </a:gs>
-            <a:gs pos="100000">
-              <a:schemeClr val="phClr">
-                <a:shade val="30000"/>
-                <a:satMod val="200000"/>
-              </a:schemeClr>
-            </a:gs>
-          </a:gsLst>
-          <a:path path="circle">
-            <a:fillToRect l="50000" t="50000" r="50000" b="50000"/>
-          </a:path>
-        </a:gradFill>
-      </a:bgFillStyleLst>
-    </a:fmtScheme>
-  </a:themeElements>
-</a:theme>
 </file>
</xml_diff>